<commit_message>
Updated Storage Component Diagram
</commit_message>
<xml_diff>
--- a/docs/diagrams/StorageComponentClassDiagram.pptx
+++ b/docs/diagrams/StorageComponentClassDiagram.pptx
@@ -107,6 +107,22 @@
       </a:defRPr>
     </a:lvl9pPr>
   </p:defaultTextStyle>
+  <p:extLst>
+    <p:ext uri="{EFAFB233-063F-42B5-8137-9DF3F51BA10A}">
+      <p15:sldGuideLst xmlns:p15="http://schemas.microsoft.com/office/powerpoint/2012/main">
+        <p15:guide id="1" orient="horz" pos="1488">
+          <p15:clr>
+            <a:srgbClr val="A4A3A4"/>
+          </p15:clr>
+        </p15:guide>
+        <p15:guide id="2" pos="2880">
+          <p15:clr>
+            <a:srgbClr val="A4A3A4"/>
+          </p15:clr>
+        </p15:guide>
+      </p15:sldGuideLst>
+    </p:ext>
+  </p:extLst>
 </p:presentation>
 </file>
 
@@ -192,7 +208,7 @@
           <a:p>
             <a:fld id="{F5CC4B3F-88C1-4FFA-B1B6-F41C21DC6924}" type="datetimeFigureOut">
               <a:rPr lang="en-US" smtClean="0"/>
-              <a:t>10/16/2016</a:t>
+              <a:t>10/13/2018</a:t>
             </a:fld>
             <a:endParaRPr lang="en-US"/>
           </a:p>
@@ -256,38 +272,37 @@
           <a:p>
             <a:pPr lvl="0"/>
             <a:r>
-              <a:rPr lang="en-US" smtClean="0"/>
+              <a:rPr lang="en-US"/>
               <a:t>Click to edit Master text styles</a:t>
             </a:r>
           </a:p>
           <a:p>
             <a:pPr lvl="1"/>
             <a:r>
-              <a:rPr lang="en-US" smtClean="0"/>
+              <a:rPr lang="en-US"/>
               <a:t>Second level</a:t>
             </a:r>
           </a:p>
           <a:p>
             <a:pPr lvl="2"/>
             <a:r>
-              <a:rPr lang="en-US" smtClean="0"/>
+              <a:rPr lang="en-US"/>
               <a:t>Third level</a:t>
             </a:r>
           </a:p>
           <a:p>
             <a:pPr lvl="3"/>
             <a:r>
-              <a:rPr lang="en-US" smtClean="0"/>
+              <a:rPr lang="en-US"/>
               <a:t>Fourth level</a:t>
             </a:r>
           </a:p>
           <a:p>
             <a:pPr lvl="4"/>
             <a:r>
-              <a:rPr lang="en-US" smtClean="0"/>
+              <a:rPr lang="en-US"/>
               <a:t>Fifth level</a:t>
             </a:r>
-            <a:endParaRPr lang="en-US"/>
           </a:p>
         </p:txBody>
       </p:sp>
@@ -498,10 +513,9 @@
           <a:lstStyle/>
           <a:p>
             <a:r>
-              <a:rPr lang="en-US" smtClean="0"/>
+              <a:rPr lang="en-US"/>
               <a:t>Click to edit Master title style</a:t>
             </a:r>
-            <a:endParaRPr lang="en-US"/>
           </a:p>
         </p:txBody>
       </p:sp>
@@ -617,10 +631,9 @@
           </a:lstStyle>
           <a:p>
             <a:r>
-              <a:rPr lang="en-US" smtClean="0"/>
+              <a:rPr lang="en-US"/>
               <a:t>Click to edit Master subtitle style</a:t>
             </a:r>
-            <a:endParaRPr lang="en-US"/>
           </a:p>
         </p:txBody>
       </p:sp>
@@ -641,7 +654,7 @@
           <a:p>
             <a:fld id="{78C97017-6FC3-485B-9764-EAC9E56C1D49}" type="datetimeFigureOut">
               <a:rPr lang="en-US" smtClean="0"/>
-              <a:t>10/16/2016</a:t>
+              <a:t>10/13/2018</a:t>
             </a:fld>
             <a:endParaRPr lang="en-US"/>
           </a:p>
@@ -735,10 +748,9 @@
           <a:lstStyle/>
           <a:p>
             <a:r>
-              <a:rPr lang="en-US" smtClean="0"/>
+              <a:rPr lang="en-US"/>
               <a:t>Click to edit Master title style</a:t>
             </a:r>
-            <a:endParaRPr lang="en-US"/>
           </a:p>
         </p:txBody>
       </p:sp>
@@ -759,38 +771,37 @@
           <a:p>
             <a:pPr lvl="0"/>
             <a:r>
-              <a:rPr lang="en-US" smtClean="0"/>
+              <a:rPr lang="en-US"/>
               <a:t>Click to edit Master text styles</a:t>
             </a:r>
           </a:p>
           <a:p>
             <a:pPr lvl="1"/>
             <a:r>
-              <a:rPr lang="en-US" smtClean="0"/>
+              <a:rPr lang="en-US"/>
               <a:t>Second level</a:t>
             </a:r>
           </a:p>
           <a:p>
             <a:pPr lvl="2"/>
             <a:r>
-              <a:rPr lang="en-US" smtClean="0"/>
+              <a:rPr lang="en-US"/>
               <a:t>Third level</a:t>
             </a:r>
           </a:p>
           <a:p>
             <a:pPr lvl="3"/>
             <a:r>
-              <a:rPr lang="en-US" smtClean="0"/>
+              <a:rPr lang="en-US"/>
               <a:t>Fourth level</a:t>
             </a:r>
           </a:p>
           <a:p>
             <a:pPr lvl="4"/>
             <a:r>
-              <a:rPr lang="en-US" smtClean="0"/>
+              <a:rPr lang="en-US"/>
               <a:t>Fifth level</a:t>
             </a:r>
-            <a:endParaRPr lang="en-US"/>
           </a:p>
         </p:txBody>
       </p:sp>
@@ -811,7 +822,7 @@
           <a:p>
             <a:fld id="{78C97017-6FC3-485B-9764-EAC9E56C1D49}" type="datetimeFigureOut">
               <a:rPr lang="en-US" smtClean="0"/>
-              <a:t>10/16/2016</a:t>
+              <a:t>10/13/2018</a:t>
             </a:fld>
             <a:endParaRPr lang="en-US"/>
           </a:p>
@@ -910,10 +921,9 @@
           <a:lstStyle/>
           <a:p>
             <a:r>
-              <a:rPr lang="en-US" smtClean="0"/>
+              <a:rPr lang="en-US"/>
               <a:t>Click to edit Master title style</a:t>
             </a:r>
-            <a:endParaRPr lang="en-US"/>
           </a:p>
         </p:txBody>
       </p:sp>
@@ -939,38 +949,37 @@
           <a:p>
             <a:pPr lvl="0"/>
             <a:r>
-              <a:rPr lang="en-US" smtClean="0"/>
+              <a:rPr lang="en-US"/>
               <a:t>Click to edit Master text styles</a:t>
             </a:r>
           </a:p>
           <a:p>
             <a:pPr lvl="1"/>
             <a:r>
-              <a:rPr lang="en-US" smtClean="0"/>
+              <a:rPr lang="en-US"/>
               <a:t>Second level</a:t>
             </a:r>
           </a:p>
           <a:p>
             <a:pPr lvl="2"/>
             <a:r>
-              <a:rPr lang="en-US" smtClean="0"/>
+              <a:rPr lang="en-US"/>
               <a:t>Third level</a:t>
             </a:r>
           </a:p>
           <a:p>
             <a:pPr lvl="3"/>
             <a:r>
-              <a:rPr lang="en-US" smtClean="0"/>
+              <a:rPr lang="en-US"/>
               <a:t>Fourth level</a:t>
             </a:r>
           </a:p>
           <a:p>
             <a:pPr lvl="4"/>
             <a:r>
-              <a:rPr lang="en-US" smtClean="0"/>
+              <a:rPr lang="en-US"/>
               <a:t>Fifth level</a:t>
             </a:r>
-            <a:endParaRPr lang="en-US"/>
           </a:p>
         </p:txBody>
       </p:sp>
@@ -991,7 +1000,7 @@
           <a:p>
             <a:fld id="{78C97017-6FC3-485B-9764-EAC9E56C1D49}" type="datetimeFigureOut">
               <a:rPr lang="en-US" smtClean="0"/>
-              <a:t>10/16/2016</a:t>
+              <a:t>10/13/2018</a:t>
             </a:fld>
             <a:endParaRPr lang="en-US"/>
           </a:p>
@@ -1085,10 +1094,9 @@
           <a:lstStyle/>
           <a:p>
             <a:r>
-              <a:rPr lang="en-US" smtClean="0"/>
+              <a:rPr lang="en-US"/>
               <a:t>Click to edit Master title style</a:t>
             </a:r>
-            <a:endParaRPr lang="en-US"/>
           </a:p>
         </p:txBody>
       </p:sp>
@@ -1109,38 +1117,37 @@
           <a:p>
             <a:pPr lvl="0"/>
             <a:r>
-              <a:rPr lang="en-US" smtClean="0"/>
+              <a:rPr lang="en-US"/>
               <a:t>Click to edit Master text styles</a:t>
             </a:r>
           </a:p>
           <a:p>
             <a:pPr lvl="1"/>
             <a:r>
-              <a:rPr lang="en-US" smtClean="0"/>
+              <a:rPr lang="en-US"/>
               <a:t>Second level</a:t>
             </a:r>
           </a:p>
           <a:p>
             <a:pPr lvl="2"/>
             <a:r>
-              <a:rPr lang="en-US" smtClean="0"/>
+              <a:rPr lang="en-US"/>
               <a:t>Third level</a:t>
             </a:r>
           </a:p>
           <a:p>
             <a:pPr lvl="3"/>
             <a:r>
-              <a:rPr lang="en-US" smtClean="0"/>
+              <a:rPr lang="en-US"/>
               <a:t>Fourth level</a:t>
             </a:r>
           </a:p>
           <a:p>
             <a:pPr lvl="4"/>
             <a:r>
-              <a:rPr lang="en-US" smtClean="0"/>
+              <a:rPr lang="en-US"/>
               <a:t>Fifth level</a:t>
             </a:r>
-            <a:endParaRPr lang="en-US"/>
           </a:p>
         </p:txBody>
       </p:sp>
@@ -1161,7 +1168,7 @@
           <a:p>
             <a:fld id="{78C97017-6FC3-485B-9764-EAC9E56C1D49}" type="datetimeFigureOut">
               <a:rPr lang="en-US" smtClean="0"/>
-              <a:t>10/16/2016</a:t>
+              <a:t>10/13/2018</a:t>
             </a:fld>
             <a:endParaRPr lang="en-US"/>
           </a:p>
@@ -1264,10 +1271,9 @@
           </a:lstStyle>
           <a:p>
             <a:r>
-              <a:rPr lang="en-US" smtClean="0"/>
+              <a:rPr lang="en-US"/>
               <a:t>Click to edit Master title style</a:t>
             </a:r>
-            <a:endParaRPr lang="en-US"/>
           </a:p>
         </p:txBody>
       </p:sp>
@@ -1384,7 +1390,7 @@
           <a:p>
             <a:pPr lvl="0"/>
             <a:r>
-              <a:rPr lang="en-US" smtClean="0"/>
+              <a:rPr lang="en-US"/>
               <a:t>Click to edit Master text styles</a:t>
             </a:r>
           </a:p>
@@ -1407,7 +1413,7 @@
           <a:p>
             <a:fld id="{78C97017-6FC3-485B-9764-EAC9E56C1D49}" type="datetimeFigureOut">
               <a:rPr lang="en-US" smtClean="0"/>
-              <a:t>10/16/2016</a:t>
+              <a:t>10/13/2018</a:t>
             </a:fld>
             <a:endParaRPr lang="en-US"/>
           </a:p>
@@ -1501,10 +1507,9 @@
           <a:lstStyle/>
           <a:p>
             <a:r>
-              <a:rPr lang="en-US" smtClean="0"/>
+              <a:rPr lang="en-US"/>
               <a:t>Click to edit Master title style</a:t>
             </a:r>
-            <a:endParaRPr lang="en-US"/>
           </a:p>
         </p:txBody>
       </p:sp>
@@ -1558,38 +1563,37 @@
           <a:p>
             <a:pPr lvl="0"/>
             <a:r>
-              <a:rPr lang="en-US" smtClean="0"/>
+              <a:rPr lang="en-US"/>
               <a:t>Click to edit Master text styles</a:t>
             </a:r>
           </a:p>
           <a:p>
             <a:pPr lvl="1"/>
             <a:r>
-              <a:rPr lang="en-US" smtClean="0"/>
+              <a:rPr lang="en-US"/>
               <a:t>Second level</a:t>
             </a:r>
           </a:p>
           <a:p>
             <a:pPr lvl="2"/>
             <a:r>
-              <a:rPr lang="en-US" smtClean="0"/>
+              <a:rPr lang="en-US"/>
               <a:t>Third level</a:t>
             </a:r>
           </a:p>
           <a:p>
             <a:pPr lvl="3"/>
             <a:r>
-              <a:rPr lang="en-US" smtClean="0"/>
+              <a:rPr lang="en-US"/>
               <a:t>Fourth level</a:t>
             </a:r>
           </a:p>
           <a:p>
             <a:pPr lvl="4"/>
             <a:r>
-              <a:rPr lang="en-US" smtClean="0"/>
+              <a:rPr lang="en-US"/>
               <a:t>Fifth level</a:t>
             </a:r>
-            <a:endParaRPr lang="en-US"/>
           </a:p>
         </p:txBody>
       </p:sp>
@@ -1643,38 +1647,37 @@
           <a:p>
             <a:pPr lvl="0"/>
             <a:r>
-              <a:rPr lang="en-US" smtClean="0"/>
+              <a:rPr lang="en-US"/>
               <a:t>Click to edit Master text styles</a:t>
             </a:r>
           </a:p>
           <a:p>
             <a:pPr lvl="1"/>
             <a:r>
-              <a:rPr lang="en-US" smtClean="0"/>
+              <a:rPr lang="en-US"/>
               <a:t>Second level</a:t>
             </a:r>
           </a:p>
           <a:p>
             <a:pPr lvl="2"/>
             <a:r>
-              <a:rPr lang="en-US" smtClean="0"/>
+              <a:rPr lang="en-US"/>
               <a:t>Third level</a:t>
             </a:r>
           </a:p>
           <a:p>
             <a:pPr lvl="3"/>
             <a:r>
-              <a:rPr lang="en-US" smtClean="0"/>
+              <a:rPr lang="en-US"/>
               <a:t>Fourth level</a:t>
             </a:r>
           </a:p>
           <a:p>
             <a:pPr lvl="4"/>
             <a:r>
-              <a:rPr lang="en-US" smtClean="0"/>
+              <a:rPr lang="en-US"/>
               <a:t>Fifth level</a:t>
             </a:r>
-            <a:endParaRPr lang="en-US"/>
           </a:p>
         </p:txBody>
       </p:sp>
@@ -1695,7 +1698,7 @@
           <a:p>
             <a:fld id="{78C97017-6FC3-485B-9764-EAC9E56C1D49}" type="datetimeFigureOut">
               <a:rPr lang="en-US" smtClean="0"/>
-              <a:t>10/16/2016</a:t>
+              <a:t>10/13/2018</a:t>
             </a:fld>
             <a:endParaRPr lang="en-US"/>
           </a:p>
@@ -1793,10 +1796,9 @@
           </a:lstStyle>
           <a:p>
             <a:r>
-              <a:rPr lang="en-US" smtClean="0"/>
+              <a:rPr lang="en-US"/>
               <a:t>Click to edit Master title style</a:t>
             </a:r>
-            <a:endParaRPr lang="en-US"/>
           </a:p>
         </p:txBody>
       </p:sp>
@@ -1859,7 +1861,7 @@
           <a:p>
             <a:pPr lvl="0"/>
             <a:r>
-              <a:rPr lang="en-US" smtClean="0"/>
+              <a:rPr lang="en-US"/>
               <a:t>Click to edit Master text styles</a:t>
             </a:r>
           </a:p>
@@ -1915,38 +1917,37 @@
           <a:p>
             <a:pPr lvl="0"/>
             <a:r>
-              <a:rPr lang="en-US" smtClean="0"/>
+              <a:rPr lang="en-US"/>
               <a:t>Click to edit Master text styles</a:t>
             </a:r>
           </a:p>
           <a:p>
             <a:pPr lvl="1"/>
             <a:r>
-              <a:rPr lang="en-US" smtClean="0"/>
+              <a:rPr lang="en-US"/>
               <a:t>Second level</a:t>
             </a:r>
           </a:p>
           <a:p>
             <a:pPr lvl="2"/>
             <a:r>
-              <a:rPr lang="en-US" smtClean="0"/>
+              <a:rPr lang="en-US"/>
               <a:t>Third level</a:t>
             </a:r>
           </a:p>
           <a:p>
             <a:pPr lvl="3"/>
             <a:r>
-              <a:rPr lang="en-US" smtClean="0"/>
+              <a:rPr lang="en-US"/>
               <a:t>Fourth level</a:t>
             </a:r>
           </a:p>
           <a:p>
             <a:pPr lvl="4"/>
             <a:r>
-              <a:rPr lang="en-US" smtClean="0"/>
+              <a:rPr lang="en-US"/>
               <a:t>Fifth level</a:t>
             </a:r>
-            <a:endParaRPr lang="en-US"/>
           </a:p>
         </p:txBody>
       </p:sp>
@@ -2009,7 +2010,7 @@
           <a:p>
             <a:pPr lvl="0"/>
             <a:r>
-              <a:rPr lang="en-US" smtClean="0"/>
+              <a:rPr lang="en-US"/>
               <a:t>Click to edit Master text styles</a:t>
             </a:r>
           </a:p>
@@ -2065,38 +2066,37 @@
           <a:p>
             <a:pPr lvl="0"/>
             <a:r>
-              <a:rPr lang="en-US" smtClean="0"/>
+              <a:rPr lang="en-US"/>
               <a:t>Click to edit Master text styles</a:t>
             </a:r>
           </a:p>
           <a:p>
             <a:pPr lvl="1"/>
             <a:r>
-              <a:rPr lang="en-US" smtClean="0"/>
+              <a:rPr lang="en-US"/>
               <a:t>Second level</a:t>
             </a:r>
           </a:p>
           <a:p>
             <a:pPr lvl="2"/>
             <a:r>
-              <a:rPr lang="en-US" smtClean="0"/>
+              <a:rPr lang="en-US"/>
               <a:t>Third level</a:t>
             </a:r>
           </a:p>
           <a:p>
             <a:pPr lvl="3"/>
             <a:r>
-              <a:rPr lang="en-US" smtClean="0"/>
+              <a:rPr lang="en-US"/>
               <a:t>Fourth level</a:t>
             </a:r>
           </a:p>
           <a:p>
             <a:pPr lvl="4"/>
             <a:r>
-              <a:rPr lang="en-US" smtClean="0"/>
+              <a:rPr lang="en-US"/>
               <a:t>Fifth level</a:t>
             </a:r>
-            <a:endParaRPr lang="en-US"/>
           </a:p>
         </p:txBody>
       </p:sp>
@@ -2117,7 +2117,7 @@
           <a:p>
             <a:fld id="{78C97017-6FC3-485B-9764-EAC9E56C1D49}" type="datetimeFigureOut">
               <a:rPr lang="en-US" smtClean="0"/>
-              <a:t>10/16/2016</a:t>
+              <a:t>10/13/2018</a:t>
             </a:fld>
             <a:endParaRPr lang="en-US"/>
           </a:p>
@@ -2211,10 +2211,9 @@
           <a:lstStyle/>
           <a:p>
             <a:r>
-              <a:rPr lang="en-US" smtClean="0"/>
+              <a:rPr lang="en-US"/>
               <a:t>Click to edit Master title style</a:t>
             </a:r>
-            <a:endParaRPr lang="en-US"/>
           </a:p>
         </p:txBody>
       </p:sp>
@@ -2235,7 +2234,7 @@
           <a:p>
             <a:fld id="{78C97017-6FC3-485B-9764-EAC9E56C1D49}" type="datetimeFigureOut">
               <a:rPr lang="en-US" smtClean="0"/>
-              <a:t>10/16/2016</a:t>
+              <a:t>10/13/2018</a:t>
             </a:fld>
             <a:endParaRPr lang="en-US"/>
           </a:p>
@@ -2330,7 +2329,7 @@
           <a:p>
             <a:fld id="{78C97017-6FC3-485B-9764-EAC9E56C1D49}" type="datetimeFigureOut">
               <a:rPr lang="en-US" smtClean="0"/>
-              <a:t>10/16/2016</a:t>
+              <a:t>10/13/2018</a:t>
             </a:fld>
             <a:endParaRPr lang="en-US"/>
           </a:p>
@@ -2433,10 +2432,9 @@
           </a:lstStyle>
           <a:p>
             <a:r>
-              <a:rPr lang="en-US" smtClean="0"/>
+              <a:rPr lang="en-US"/>
               <a:t>Click to edit Master title style</a:t>
             </a:r>
-            <a:endParaRPr lang="en-US"/>
           </a:p>
         </p:txBody>
       </p:sp>
@@ -2490,38 +2488,37 @@
           <a:p>
             <a:pPr lvl="0"/>
             <a:r>
-              <a:rPr lang="en-US" smtClean="0"/>
+              <a:rPr lang="en-US"/>
               <a:t>Click to edit Master text styles</a:t>
             </a:r>
           </a:p>
           <a:p>
             <a:pPr lvl="1"/>
             <a:r>
-              <a:rPr lang="en-US" smtClean="0"/>
+              <a:rPr lang="en-US"/>
               <a:t>Second level</a:t>
             </a:r>
           </a:p>
           <a:p>
             <a:pPr lvl="2"/>
             <a:r>
-              <a:rPr lang="en-US" smtClean="0"/>
+              <a:rPr lang="en-US"/>
               <a:t>Third level</a:t>
             </a:r>
           </a:p>
           <a:p>
             <a:pPr lvl="3"/>
             <a:r>
-              <a:rPr lang="en-US" smtClean="0"/>
+              <a:rPr lang="en-US"/>
               <a:t>Fourth level</a:t>
             </a:r>
           </a:p>
           <a:p>
             <a:pPr lvl="4"/>
             <a:r>
-              <a:rPr lang="en-US" smtClean="0"/>
+              <a:rPr lang="en-US"/>
               <a:t>Fifth level</a:t>
             </a:r>
-            <a:endParaRPr lang="en-US"/>
           </a:p>
         </p:txBody>
       </p:sp>
@@ -2584,7 +2581,7 @@
           <a:p>
             <a:pPr lvl="0"/>
             <a:r>
-              <a:rPr lang="en-US" smtClean="0"/>
+              <a:rPr lang="en-US"/>
               <a:t>Click to edit Master text styles</a:t>
             </a:r>
           </a:p>
@@ -2607,7 +2604,7 @@
           <a:p>
             <a:fld id="{78C97017-6FC3-485B-9764-EAC9E56C1D49}" type="datetimeFigureOut">
               <a:rPr lang="en-US" smtClean="0"/>
-              <a:t>10/16/2016</a:t>
+              <a:t>10/13/2018</a:t>
             </a:fld>
             <a:endParaRPr lang="en-US"/>
           </a:p>
@@ -2710,10 +2707,9 @@
           </a:lstStyle>
           <a:p>
             <a:r>
-              <a:rPr lang="en-US" smtClean="0"/>
+              <a:rPr lang="en-US"/>
               <a:t>Click to edit Master title style</a:t>
             </a:r>
-            <a:endParaRPr lang="en-US"/>
           </a:p>
         </p:txBody>
       </p:sp>
@@ -2837,7 +2833,7 @@
           <a:p>
             <a:pPr lvl="0"/>
             <a:r>
-              <a:rPr lang="en-US" smtClean="0"/>
+              <a:rPr lang="en-US"/>
               <a:t>Click to edit Master text styles</a:t>
             </a:r>
           </a:p>
@@ -2860,7 +2856,7 @@
           <a:p>
             <a:fld id="{78C97017-6FC3-485B-9764-EAC9E56C1D49}" type="datetimeFigureOut">
               <a:rPr lang="en-US" smtClean="0"/>
-              <a:t>10/16/2016</a:t>
+              <a:t>10/13/2018</a:t>
             </a:fld>
             <a:endParaRPr lang="en-US"/>
           </a:p>
@@ -2969,10 +2965,9 @@
           <a:lstStyle/>
           <a:p>
             <a:r>
-              <a:rPr lang="en-US" smtClean="0"/>
+              <a:rPr lang="en-US"/>
               <a:t>Click to edit Master title style</a:t>
             </a:r>
-            <a:endParaRPr lang="en-US"/>
           </a:p>
         </p:txBody>
       </p:sp>
@@ -3003,38 +2998,37 @@
           <a:p>
             <a:pPr lvl="0"/>
             <a:r>
-              <a:rPr lang="en-US" smtClean="0"/>
+              <a:rPr lang="en-US"/>
               <a:t>Click to edit Master text styles</a:t>
             </a:r>
           </a:p>
           <a:p>
             <a:pPr lvl="1"/>
             <a:r>
-              <a:rPr lang="en-US" smtClean="0"/>
+              <a:rPr lang="en-US"/>
               <a:t>Second level</a:t>
             </a:r>
           </a:p>
           <a:p>
             <a:pPr lvl="2"/>
             <a:r>
-              <a:rPr lang="en-US" smtClean="0"/>
+              <a:rPr lang="en-US"/>
               <a:t>Third level</a:t>
             </a:r>
           </a:p>
           <a:p>
             <a:pPr lvl="3"/>
             <a:r>
-              <a:rPr lang="en-US" smtClean="0"/>
+              <a:rPr lang="en-US"/>
               <a:t>Fourth level</a:t>
             </a:r>
           </a:p>
           <a:p>
             <a:pPr lvl="4"/>
             <a:r>
-              <a:rPr lang="en-US" smtClean="0"/>
+              <a:rPr lang="en-US"/>
               <a:t>Fifth level</a:t>
             </a:r>
-            <a:endParaRPr lang="en-US"/>
           </a:p>
         </p:txBody>
       </p:sp>
@@ -3073,7 +3067,7 @@
           <a:p>
             <a:fld id="{78C97017-6FC3-485B-9764-EAC9E56C1D49}" type="datetimeFigureOut">
               <a:rPr lang="en-US" smtClean="0"/>
-              <a:t>10/16/2016</a:t>
+              <a:t>10/13/2018</a:t>
             </a:fld>
             <a:endParaRPr lang="en-US"/>
           </a:p>
@@ -3457,7 +3451,7 @@
         <p:spPr>
           <a:xfrm>
             <a:off x="1119865" y="2086382"/>
-            <a:ext cx="7871735" cy="1723618"/>
+            <a:ext cx="7871735" cy="2937098"/>
           </a:xfrm>
           <a:prstGeom prst="roundRect">
             <a:avLst>
@@ -3494,7 +3488,7 @@
           <a:lstStyle/>
           <a:p>
             <a:r>
-              <a:rPr lang="en-US" sz="1200" b="1" dirty="0" smtClean="0">
+              <a:rPr lang="en-US" sz="1200" b="1" dirty="0">
                 <a:solidFill>
                   <a:schemeClr val="accent6">
                     <a:lumMod val="75000"/>
@@ -3561,7 +3555,7 @@
           <a:p>
             <a:pPr algn="ctr"/>
             <a:r>
-              <a:rPr lang="en-US" sz="1050" dirty="0" smtClean="0">
+              <a:rPr lang="en-US" sz="1050" dirty="0">
                 <a:solidFill>
                   <a:schemeClr val="bg1"/>
                 </a:solidFill>
@@ -3569,14 +3563,14 @@
               <a:t>&lt;&lt;interface&gt;&gt;</a:t>
             </a:r>
             <a:br>
-              <a:rPr lang="en-US" sz="1050" dirty="0" smtClean="0">
+              <a:rPr lang="en-US" sz="1050" dirty="0">
                 <a:solidFill>
                   <a:schemeClr val="bg1"/>
                 </a:solidFill>
               </a:rPr>
             </a:br>
             <a:r>
-              <a:rPr lang="en-US" sz="1050" dirty="0" err="1" smtClean="0">
+              <a:rPr lang="en-US" sz="1050" dirty="0" err="1">
                 <a:solidFill>
                   <a:schemeClr val="bg1"/>
                 </a:solidFill>
@@ -3599,8 +3593,8 @@
         </p:nvSpPr>
         <p:spPr>
           <a:xfrm rot="16200000">
-            <a:off x="1683963" y="2868687"/>
-            <a:ext cx="1093635" cy="346760"/>
+            <a:off x="1112465" y="3440185"/>
+            <a:ext cx="2236632" cy="346760"/>
           </a:xfrm>
           <a:prstGeom prst="rect">
             <a:avLst/>
@@ -3639,7 +3633,7 @@
           <a:p>
             <a:pPr algn="ctr"/>
             <a:r>
-              <a:rPr lang="en-US" sz="1050" dirty="0" err="1" smtClean="0">
+              <a:rPr lang="en-US" sz="1050" dirty="0" err="1">
                 <a:solidFill>
                   <a:schemeClr val="bg1"/>
                 </a:solidFill>
@@ -3662,8 +3656,8 @@
         </p:nvSpPr>
         <p:spPr>
           <a:xfrm rot="16200000">
-            <a:off x="956202" y="2861202"/>
-            <a:ext cx="1093635" cy="346760"/>
+            <a:off x="384702" y="3432702"/>
+            <a:ext cx="2236635" cy="346760"/>
           </a:xfrm>
           <a:prstGeom prst="rect">
             <a:avLst/>
@@ -3713,7 +3707,7 @@
           <a:p>
             <a:pPr algn="ctr"/>
             <a:r>
-              <a:rPr lang="en-US" sz="1050" dirty="0" smtClean="0">
+              <a:rPr lang="en-US" sz="1050" dirty="0">
                 <a:solidFill>
                   <a:schemeClr val="bg1"/>
                 </a:solidFill>
@@ -3736,7 +3730,7 @@
         </p:nvSpPr>
         <p:spPr>
           <a:xfrm rot="16200000">
-            <a:off x="1626910" y="2952291"/>
+            <a:off x="1621449" y="3514563"/>
             <a:ext cx="270504" cy="175523"/>
           </a:xfrm>
           <a:prstGeom prst="triangle">
@@ -3834,7 +3828,7 @@
         </p:nvCxnSpPr>
         <p:spPr>
           <a:xfrm>
-            <a:off x="910091" y="3040053"/>
+            <a:off x="893931" y="3600894"/>
             <a:ext cx="419548" cy="2860"/>
           </a:xfrm>
           <a:prstGeom prst="bentConnector3">
@@ -3879,7 +3873,7 @@
         </p:nvCxnSpPr>
         <p:spPr>
           <a:xfrm flipV="1">
-            <a:off x="1849924" y="3040052"/>
+            <a:off x="1844463" y="3602324"/>
             <a:ext cx="216105" cy="1"/>
           </a:xfrm>
           <a:prstGeom prst="line">
@@ -4147,7 +4141,7 @@
           <a:p>
             <a:pPr algn="ctr"/>
             <a:r>
-              <a:rPr lang="en-US" sz="1050" b="1" dirty="0" err="1" smtClean="0">
+              <a:rPr lang="en-US" sz="1050" b="1" dirty="0" err="1">
                 <a:solidFill>
                   <a:schemeClr val="accent6">
                     <a:lumMod val="75000"/>
@@ -4156,18 +4150,8 @@
               </a:rPr>
               <a:t>XmlAddressBook</a:t>
             </a:r>
-            <a:r>
-              <a:rPr lang="en-US" sz="1050" b="1" dirty="0" smtClean="0">
-                <a:solidFill>
-                  <a:schemeClr val="accent6">
-                    <a:lumMod val="75000"/>
-                  </a:schemeClr>
-                </a:solidFill>
-              </a:rPr>
-              <a:t/>
-            </a:r>
             <a:br>
-              <a:rPr lang="en-US" sz="1050" b="1" dirty="0" smtClean="0">
+              <a:rPr lang="en-US" sz="1050" b="1" dirty="0">
                 <a:solidFill>
                   <a:schemeClr val="accent6">
                     <a:lumMod val="75000"/>
@@ -4176,7 +4160,7 @@
               </a:rPr>
             </a:br>
             <a:r>
-              <a:rPr lang="en-US" sz="1050" b="1" dirty="0" smtClean="0">
+              <a:rPr lang="en-US" sz="1050" b="1" dirty="0">
                 <a:solidFill>
                   <a:schemeClr val="accent6">
                     <a:lumMod val="75000"/>
@@ -4243,7 +4227,7 @@
           <a:p>
             <a:pPr algn="ctr"/>
             <a:r>
-              <a:rPr lang="en-US" sz="1050" dirty="0" smtClean="0">
+              <a:rPr lang="en-US" sz="1050" dirty="0">
                 <a:solidFill>
                   <a:schemeClr val="bg1"/>
                 </a:solidFill>
@@ -4251,14 +4235,14 @@
               <a:t>&lt;&lt;interface&gt;&gt;</a:t>
             </a:r>
             <a:br>
-              <a:rPr lang="en-US" sz="1050" dirty="0" smtClean="0">
+              <a:rPr lang="en-US" sz="1050" dirty="0">
                 <a:solidFill>
                   <a:schemeClr val="bg1"/>
                 </a:solidFill>
               </a:rPr>
             </a:br>
             <a:r>
-              <a:rPr lang="en-US" sz="1050" dirty="0" err="1" smtClean="0">
+              <a:rPr lang="en-US" sz="1050" dirty="0" err="1">
                 <a:solidFill>
                   <a:schemeClr val="bg1"/>
                 </a:solidFill>
@@ -4516,30 +4500,22 @@
           <a:p>
             <a:pPr algn="ctr"/>
             <a:r>
-              <a:rPr lang="en-US" sz="1050" dirty="0" err="1" smtClean="0">
+              <a:rPr lang="en-US" sz="1050" dirty="0" err="1">
                 <a:solidFill>
                   <a:schemeClr val="bg1"/>
                 </a:solidFill>
               </a:rPr>
               <a:t>JsonUserPrefs</a:t>
             </a:r>
-            <a:r>
-              <a:rPr lang="en-US" sz="1050" dirty="0" smtClean="0">
-                <a:solidFill>
-                  <a:schemeClr val="bg1"/>
-                </a:solidFill>
-              </a:rPr>
-              <a:t/>
-            </a:r>
             <a:br>
-              <a:rPr lang="en-US" sz="1050" dirty="0" smtClean="0">
+              <a:rPr lang="en-US" sz="1050" dirty="0">
                 <a:solidFill>
                   <a:schemeClr val="bg1"/>
                 </a:solidFill>
               </a:rPr>
             </a:br>
             <a:r>
-              <a:rPr lang="en-US" sz="1050" dirty="0" smtClean="0">
+              <a:rPr lang="en-US" sz="1050" dirty="0">
                 <a:solidFill>
                   <a:schemeClr val="bg1"/>
                 </a:solidFill>
@@ -4591,7 +4567,7 @@
           <a:p>
             <a:pPr algn="ctr"/>
             <a:r>
-              <a:rPr lang="en-US" sz="1050" b="1" dirty="0" err="1" smtClean="0">
+              <a:rPr lang="en-US" sz="1050" b="1" dirty="0" err="1">
                 <a:solidFill>
                   <a:schemeClr val="accent6">
                     <a:lumMod val="75000"/>
@@ -4600,18 +4576,8 @@
               </a:rPr>
               <a:t>XmlSerializable</a:t>
             </a:r>
-            <a:r>
-              <a:rPr lang="en-US" sz="1050" b="1" dirty="0" smtClean="0">
-                <a:solidFill>
-                  <a:schemeClr val="accent6">
-                    <a:lumMod val="75000"/>
-                  </a:schemeClr>
-                </a:solidFill>
-              </a:rPr>
-              <a:t/>
-            </a:r>
             <a:br>
-              <a:rPr lang="en-US" sz="1050" b="1" dirty="0" smtClean="0">
+              <a:rPr lang="en-US" sz="1050" b="1" dirty="0">
                 <a:solidFill>
                   <a:schemeClr val="accent6">
                     <a:lumMod val="75000"/>
@@ -4620,7 +4586,7 @@
               </a:rPr>
             </a:br>
             <a:r>
-              <a:rPr lang="en-US" sz="1050" b="1" dirty="0" err="1" smtClean="0">
+              <a:rPr lang="en-US" sz="1050" b="1" dirty="0" err="1">
                 <a:solidFill>
                   <a:schemeClr val="accent6">
                     <a:lumMod val="75000"/>
@@ -4650,8 +4616,8 @@
         </p:nvCxnSpPr>
         <p:spPr>
           <a:xfrm rot="5400000" flipH="1" flipV="1">
-            <a:off x="8077993" y="2992020"/>
-            <a:ext cx="335208" cy="12700"/>
+            <a:off x="8133756" y="3047783"/>
+            <a:ext cx="223683" cy="12700"/>
           </a:xfrm>
           <a:prstGeom prst="bentConnector3">
             <a:avLst>
@@ -4688,7 +4654,7 @@
         </p:nvSpPr>
         <p:spPr>
           <a:xfrm>
-            <a:off x="7615738" y="2477656"/>
+            <a:off x="7615738" y="2589181"/>
             <a:ext cx="1259718" cy="346760"/>
           </a:xfrm>
           <a:prstGeom prst="rect">
@@ -4717,7 +4683,7 @@
           <a:p>
             <a:pPr algn="ctr"/>
             <a:r>
-              <a:rPr lang="en-US" sz="1050" b="1" dirty="0" err="1" smtClean="0">
+              <a:rPr lang="en-US" sz="1050" b="1" dirty="0" err="1">
                 <a:solidFill>
                   <a:schemeClr val="accent6">
                     <a:lumMod val="75000"/>
@@ -4773,14 +4739,34 @@
           <a:p>
             <a:pPr algn="ctr"/>
             <a:r>
-              <a:rPr lang="en-US" sz="1050" b="1" dirty="0" err="1" smtClean="0">
+              <a:rPr lang="en-US" sz="1050" b="1" dirty="0" err="1">
                 <a:solidFill>
                   <a:schemeClr val="accent6">
                     <a:lumMod val="75000"/>
                   </a:schemeClr>
                 </a:solidFill>
               </a:rPr>
-              <a:t>XmlAdaptedPerson</a:t>
+              <a:t>XmlAdapted</a:t>
+            </a:r>
+            <a:endParaRPr lang="en-US" sz="1050" b="1" dirty="0">
+              <a:solidFill>
+                <a:schemeClr val="accent6">
+                  <a:lumMod val="75000"/>
+                </a:schemeClr>
+              </a:solidFill>
+            </a:endParaRPr>
+          </a:p>
+          <a:p>
+            <a:pPr algn="ctr"/>
+            <a:r>
+              <a:rPr lang="en-US" sz="1050" b="1" dirty="0">
+                <a:solidFill>
+                  <a:schemeClr val="accent6">
+                    <a:lumMod val="75000"/>
+                  </a:schemeClr>
+                </a:solidFill>
+              </a:rPr>
+              <a:t>Restaurant</a:t>
             </a:r>
             <a:endParaRPr lang="en-SG" sz="1050" b="1" dirty="0">
               <a:solidFill>
@@ -4805,6 +4791,982 @@
           <a:xfrm flipV="1">
             <a:off x="7220507" y="3333004"/>
             <a:ext cx="395231" cy="786"/>
+          </a:xfrm>
+          <a:prstGeom prst="bentConnector3">
+            <a:avLst>
+              <a:gd name="adj1" fmla="val 50000"/>
+            </a:avLst>
+          </a:prstGeom>
+          <a:ln w="19050">
+            <a:prstDash val="sysDot"/>
+            <a:headEnd type="none" w="med" len="med"/>
+            <a:tailEnd type="arrow" w="med" len="med"/>
+          </a:ln>
+          <a:effectLst/>
+        </p:spPr>
+        <p:style>
+          <a:lnRef idx="1">
+            <a:schemeClr val="accent6"/>
+          </a:lnRef>
+          <a:fillRef idx="2">
+            <a:schemeClr val="accent6"/>
+          </a:fillRef>
+          <a:effectRef idx="1">
+            <a:schemeClr val="accent6"/>
+          </a:effectRef>
+          <a:fontRef idx="minor">
+            <a:schemeClr val="dk1"/>
+          </a:fontRef>
+        </p:style>
+      </p:cxnSp>
+      <p:sp>
+        <p:nvSpPr>
+          <p:cNvPr id="45" name="Rectangle 8">
+            <a:extLst>
+              <a:ext uri="{FF2B5EF4-FFF2-40B4-BE49-F238E27FC236}">
+                <a16:creationId xmlns:a16="http://schemas.microsoft.com/office/drawing/2014/main" id="{09EEF98D-9166-4435-9891-996FD143F682}"/>
+              </a:ext>
+            </a:extLst>
+          </p:cNvPr>
+          <p:cNvSpPr/>
+          <p:nvPr/>
+        </p:nvSpPr>
+        <p:spPr>
+          <a:xfrm>
+            <a:off x="2873943" y="3638483"/>
+            <a:ext cx="1323049" cy="346760"/>
+          </a:xfrm>
+          <a:prstGeom prst="rect">
+            <a:avLst/>
+          </a:prstGeom>
+          <a:solidFill>
+            <a:schemeClr val="accent6">
+              <a:lumMod val="75000"/>
+            </a:schemeClr>
+          </a:solidFill>
+          <a:ln w="19050">
+            <a:solidFill>
+              <a:schemeClr val="accent6">
+                <a:lumMod val="75000"/>
+              </a:schemeClr>
+            </a:solidFill>
+          </a:ln>
+          <a:effectLst/>
+        </p:spPr>
+        <p:style>
+          <a:lnRef idx="1">
+            <a:schemeClr val="accent2"/>
+          </a:lnRef>
+          <a:fillRef idx="2">
+            <a:schemeClr val="accent2"/>
+          </a:fillRef>
+          <a:effectRef idx="1">
+            <a:schemeClr val="accent2"/>
+          </a:effectRef>
+          <a:fontRef idx="minor">
+            <a:schemeClr val="dk1"/>
+          </a:fontRef>
+        </p:style>
+        <p:txBody>
+          <a:bodyPr rtlCol="0" anchor="ctr"/>
+          <a:lstStyle/>
+          <a:p>
+            <a:pPr algn="ctr"/>
+            <a:r>
+              <a:rPr lang="en-US" sz="1050" dirty="0">
+                <a:solidFill>
+                  <a:schemeClr val="bg1"/>
+                </a:solidFill>
+              </a:rPr>
+              <a:t>&lt;&lt;interface&gt;&gt;</a:t>
+            </a:r>
+            <a:br>
+              <a:rPr lang="en-US" sz="1050" dirty="0">
+                <a:solidFill>
+                  <a:schemeClr val="bg1"/>
+                </a:solidFill>
+              </a:rPr>
+            </a:br>
+            <a:r>
+              <a:rPr lang="en-US" sz="1050" dirty="0" err="1">
+                <a:solidFill>
+                  <a:schemeClr val="bg1"/>
+                </a:solidFill>
+              </a:rPr>
+              <a:t>UsersStorage</a:t>
+            </a:r>
+            <a:endParaRPr lang="en-SG" sz="1050" dirty="0">
+              <a:solidFill>
+                <a:schemeClr val="bg1"/>
+              </a:solidFill>
+            </a:endParaRPr>
+          </a:p>
+        </p:txBody>
+      </p:sp>
+      <p:cxnSp>
+        <p:nvCxnSpPr>
+          <p:cNvPr id="46" name="Straight Arrow Connector 45">
+            <a:extLst>
+              <a:ext uri="{FF2B5EF4-FFF2-40B4-BE49-F238E27FC236}">
+                <a16:creationId xmlns:a16="http://schemas.microsoft.com/office/drawing/2014/main" id="{4A158225-0852-4688-8CC1-5698D42A7569}"/>
+              </a:ext>
+            </a:extLst>
+          </p:cNvPr>
+          <p:cNvCxnSpPr>
+            <a:stCxn id="47" idx="3"/>
+            <a:endCxn id="45" idx="1"/>
+          </p:cNvCxnSpPr>
+          <p:nvPr/>
+        </p:nvCxnSpPr>
+        <p:spPr>
+          <a:xfrm>
+            <a:off x="2653133" y="3806579"/>
+            <a:ext cx="220810" cy="5284"/>
+          </a:xfrm>
+          <a:prstGeom prst="straightConnector1">
+            <a:avLst/>
+          </a:prstGeom>
+          <a:ln w="19050">
+            <a:solidFill>
+              <a:schemeClr val="accent6">
+                <a:lumMod val="75000"/>
+              </a:schemeClr>
+            </a:solidFill>
+            <a:headEnd type="none" w="med" len="med"/>
+            <a:tailEnd type="arrow" w="med" len="med"/>
+          </a:ln>
+          <a:effectLst/>
+        </p:spPr>
+        <p:style>
+          <a:lnRef idx="1">
+            <a:schemeClr val="accent2"/>
+          </a:lnRef>
+          <a:fillRef idx="2">
+            <a:schemeClr val="accent2"/>
+          </a:fillRef>
+          <a:effectRef idx="1">
+            <a:schemeClr val="accent2"/>
+          </a:effectRef>
+          <a:fontRef idx="minor">
+            <a:schemeClr val="dk1"/>
+          </a:fontRef>
+        </p:style>
+      </p:cxnSp>
+      <p:sp>
+        <p:nvSpPr>
+          <p:cNvPr id="47" name="Flowchart: Decision 96">
+            <a:extLst>
+              <a:ext uri="{FF2B5EF4-FFF2-40B4-BE49-F238E27FC236}">
+                <a16:creationId xmlns:a16="http://schemas.microsoft.com/office/drawing/2014/main" id="{88E3EA8F-D62F-4F83-9D92-EE15694EDDAF}"/>
+              </a:ext>
+            </a:extLst>
+          </p:cNvPr>
+          <p:cNvSpPr/>
+          <p:nvPr/>
+        </p:nvSpPr>
+        <p:spPr>
+          <a:xfrm>
+            <a:off x="2417085" y="3719889"/>
+            <a:ext cx="236048" cy="173380"/>
+          </a:xfrm>
+          <a:prstGeom prst="flowChartDecision">
+            <a:avLst/>
+          </a:prstGeom>
+          <a:noFill/>
+          <a:ln w="19050">
+            <a:solidFill>
+              <a:schemeClr val="accent6">
+                <a:lumMod val="75000"/>
+              </a:schemeClr>
+            </a:solidFill>
+          </a:ln>
+          <a:effectLst/>
+        </p:spPr>
+        <p:style>
+          <a:lnRef idx="1">
+            <a:schemeClr val="accent2"/>
+          </a:lnRef>
+          <a:fillRef idx="2">
+            <a:schemeClr val="accent2"/>
+          </a:fillRef>
+          <a:effectRef idx="1">
+            <a:schemeClr val="accent2"/>
+          </a:effectRef>
+          <a:fontRef idx="minor">
+            <a:schemeClr val="dk1"/>
+          </a:fontRef>
+        </p:style>
+        <p:txBody>
+          <a:bodyPr rtlCol="0" anchor="ctr"/>
+          <a:lstStyle/>
+          <a:p>
+            <a:pPr algn="ctr"/>
+            <a:endParaRPr lang="en-US" sz="1050">
+              <a:solidFill>
+                <a:schemeClr val="bg1"/>
+              </a:solidFill>
+            </a:endParaRPr>
+          </a:p>
+        </p:txBody>
+      </p:sp>
+      <p:cxnSp>
+        <p:nvCxnSpPr>
+          <p:cNvPr id="48" name="Elbow Connector 63">
+            <a:extLst>
+              <a:ext uri="{FF2B5EF4-FFF2-40B4-BE49-F238E27FC236}">
+                <a16:creationId xmlns:a16="http://schemas.microsoft.com/office/drawing/2014/main" id="{64268BAE-225B-42E0-AF45-64B62913D3C3}"/>
+              </a:ext>
+            </a:extLst>
+          </p:cNvPr>
+          <p:cNvCxnSpPr>
+            <a:stCxn id="49" idx="3"/>
+            <a:endCxn id="53" idx="1"/>
+          </p:cNvCxnSpPr>
+          <p:nvPr/>
+        </p:nvCxnSpPr>
+        <p:spPr>
+          <a:xfrm flipV="1">
+            <a:off x="4394804" y="3811863"/>
+            <a:ext cx="223324" cy="1"/>
+          </a:xfrm>
+          <a:prstGeom prst="bentConnector3">
+            <a:avLst>
+              <a:gd name="adj1" fmla="val 50000"/>
+            </a:avLst>
+          </a:prstGeom>
+          <a:ln w="19050">
+            <a:solidFill>
+              <a:schemeClr val="accent6">
+                <a:lumMod val="75000"/>
+              </a:schemeClr>
+            </a:solidFill>
+            <a:prstDash val="sysDot"/>
+            <a:headEnd type="none" w="med" len="med"/>
+            <a:tailEnd type="none" w="med" len="med"/>
+          </a:ln>
+          <a:effectLst/>
+        </p:spPr>
+        <p:style>
+          <a:lnRef idx="1">
+            <a:schemeClr val="accent2"/>
+          </a:lnRef>
+          <a:fillRef idx="2">
+            <a:schemeClr val="accent2"/>
+          </a:fillRef>
+          <a:effectRef idx="1">
+            <a:schemeClr val="accent2"/>
+          </a:effectRef>
+          <a:fontRef idx="minor">
+            <a:schemeClr val="dk1"/>
+          </a:fontRef>
+        </p:style>
+      </p:cxnSp>
+      <p:sp>
+        <p:nvSpPr>
+          <p:cNvPr id="49" name="Isosceles Triangle 102">
+            <a:extLst>
+              <a:ext uri="{FF2B5EF4-FFF2-40B4-BE49-F238E27FC236}">
+                <a16:creationId xmlns:a16="http://schemas.microsoft.com/office/drawing/2014/main" id="{60E28081-6F0C-486A-91CE-635E4CEFEE4A}"/>
+              </a:ext>
+            </a:extLst>
+          </p:cNvPr>
+          <p:cNvSpPr/>
+          <p:nvPr/>
+        </p:nvSpPr>
+        <p:spPr>
+          <a:xfrm rot="5400000" flipV="1">
+            <a:off x="4171790" y="3724102"/>
+            <a:ext cx="270504" cy="175523"/>
+          </a:xfrm>
+          <a:prstGeom prst="triangle">
+            <a:avLst/>
+          </a:prstGeom>
+          <a:solidFill>
+            <a:schemeClr val="accent6">
+              <a:lumMod val="75000"/>
+            </a:schemeClr>
+          </a:solidFill>
+          <a:ln w="19050">
+            <a:solidFill>
+              <a:schemeClr val="accent6">
+                <a:lumMod val="75000"/>
+              </a:schemeClr>
+            </a:solidFill>
+          </a:ln>
+          <a:effectLst/>
+        </p:spPr>
+        <p:style>
+          <a:lnRef idx="1">
+            <a:schemeClr val="accent2"/>
+          </a:lnRef>
+          <a:fillRef idx="2">
+            <a:schemeClr val="accent2"/>
+          </a:fillRef>
+          <a:effectRef idx="1">
+            <a:schemeClr val="accent2"/>
+          </a:effectRef>
+          <a:fontRef idx="minor">
+            <a:schemeClr val="dk1"/>
+          </a:fontRef>
+        </p:style>
+        <p:txBody>
+          <a:bodyPr rtlCol="0" anchor="ctr"/>
+          <a:lstStyle/>
+          <a:p>
+            <a:pPr algn="ctr"/>
+            <a:endParaRPr lang="en-SG" sz="1050">
+              <a:solidFill>
+                <a:schemeClr val="bg1"/>
+              </a:solidFill>
+            </a:endParaRPr>
+          </a:p>
+        </p:txBody>
+      </p:sp>
+      <p:cxnSp>
+        <p:nvCxnSpPr>
+          <p:cNvPr id="51" name="Elbow Connector 122">
+            <a:extLst>
+              <a:ext uri="{FF2B5EF4-FFF2-40B4-BE49-F238E27FC236}">
+                <a16:creationId xmlns:a16="http://schemas.microsoft.com/office/drawing/2014/main" id="{3C933A7B-AADA-4948-AC91-3AE19CE562AF}"/>
+              </a:ext>
+            </a:extLst>
+          </p:cNvPr>
+          <p:cNvCxnSpPr>
+            <a:stCxn id="53" idx="3"/>
+            <a:endCxn id="67" idx="1"/>
+          </p:cNvCxnSpPr>
+          <p:nvPr/>
+        </p:nvCxnSpPr>
+        <p:spPr>
+          <a:xfrm>
+            <a:off x="5787963" y="3811863"/>
+            <a:ext cx="228600" cy="1970"/>
+          </a:xfrm>
+          <a:prstGeom prst="bentConnector3">
+            <a:avLst>
+              <a:gd name="adj1" fmla="val 50000"/>
+            </a:avLst>
+          </a:prstGeom>
+          <a:ln w="19050">
+            <a:solidFill>
+              <a:schemeClr val="accent6">
+                <a:lumMod val="75000"/>
+              </a:schemeClr>
+            </a:solidFill>
+            <a:prstDash val="sysDot"/>
+            <a:headEnd type="none" w="med" len="med"/>
+            <a:tailEnd type="arrow" w="med" len="med"/>
+          </a:ln>
+          <a:effectLst/>
+        </p:spPr>
+        <p:style>
+          <a:lnRef idx="1">
+            <a:schemeClr val="accent2"/>
+          </a:lnRef>
+          <a:fillRef idx="2">
+            <a:schemeClr val="accent2"/>
+          </a:fillRef>
+          <a:effectRef idx="1">
+            <a:schemeClr val="accent2"/>
+          </a:effectRef>
+          <a:fontRef idx="minor">
+            <a:schemeClr val="dk1"/>
+          </a:fontRef>
+        </p:style>
+      </p:cxnSp>
+      <p:sp>
+        <p:nvSpPr>
+          <p:cNvPr id="53" name="Rectangle 8">
+            <a:extLst>
+              <a:ext uri="{FF2B5EF4-FFF2-40B4-BE49-F238E27FC236}">
+                <a16:creationId xmlns:a16="http://schemas.microsoft.com/office/drawing/2014/main" id="{E89A788D-4B1F-47E1-AA1C-C43B2C0F30BD}"/>
+              </a:ext>
+            </a:extLst>
+          </p:cNvPr>
+          <p:cNvSpPr/>
+          <p:nvPr/>
+        </p:nvSpPr>
+        <p:spPr>
+          <a:xfrm>
+            <a:off x="4618128" y="3638483"/>
+            <a:ext cx="1169835" cy="346760"/>
+          </a:xfrm>
+          <a:prstGeom prst="rect">
+            <a:avLst/>
+          </a:prstGeom>
+          <a:ln w="19050"/>
+          <a:effectLst/>
+        </p:spPr>
+        <p:style>
+          <a:lnRef idx="1">
+            <a:schemeClr val="accent6"/>
+          </a:lnRef>
+          <a:fillRef idx="2">
+            <a:schemeClr val="accent6"/>
+          </a:fillRef>
+          <a:effectRef idx="1">
+            <a:schemeClr val="accent6"/>
+          </a:effectRef>
+          <a:fontRef idx="minor">
+            <a:schemeClr val="dk1"/>
+          </a:fontRef>
+        </p:style>
+        <p:txBody>
+          <a:bodyPr rtlCol="0" anchor="ctr"/>
+          <a:lstStyle/>
+          <a:p>
+            <a:pPr algn="ctr"/>
+            <a:r>
+              <a:rPr lang="en-US" sz="1050" b="1" dirty="0" err="1">
+                <a:solidFill>
+                  <a:schemeClr val="accent6">
+                    <a:lumMod val="75000"/>
+                  </a:schemeClr>
+                </a:solidFill>
+              </a:rPr>
+              <a:t>XmlUsersStorage</a:t>
+            </a:r>
+            <a:endParaRPr lang="en-SG" sz="1050" b="1" dirty="0">
+              <a:solidFill>
+                <a:schemeClr val="accent6">
+                  <a:lumMod val="75000"/>
+                </a:schemeClr>
+              </a:solidFill>
+            </a:endParaRPr>
+          </a:p>
+        </p:txBody>
+      </p:sp>
+      <p:sp>
+        <p:nvSpPr>
+          <p:cNvPr id="67" name="Rectangle 8">
+            <a:extLst>
+              <a:ext uri="{FF2B5EF4-FFF2-40B4-BE49-F238E27FC236}">
+                <a16:creationId xmlns:a16="http://schemas.microsoft.com/office/drawing/2014/main" id="{BD411526-7F42-4A64-B048-EAC9F4F15F8D}"/>
+              </a:ext>
+            </a:extLst>
+          </p:cNvPr>
+          <p:cNvSpPr/>
+          <p:nvPr/>
+        </p:nvSpPr>
+        <p:spPr>
+          <a:xfrm>
+            <a:off x="6016563" y="3640453"/>
+            <a:ext cx="1200707" cy="346760"/>
+          </a:xfrm>
+          <a:prstGeom prst="rect">
+            <a:avLst/>
+          </a:prstGeom>
+          <a:ln w="19050"/>
+          <a:effectLst/>
+        </p:spPr>
+        <p:style>
+          <a:lnRef idx="1">
+            <a:schemeClr val="accent6"/>
+          </a:lnRef>
+          <a:fillRef idx="2">
+            <a:schemeClr val="accent6"/>
+          </a:fillRef>
+          <a:effectRef idx="1">
+            <a:schemeClr val="accent6"/>
+          </a:effectRef>
+          <a:fontRef idx="minor">
+            <a:schemeClr val="dk1"/>
+          </a:fontRef>
+        </p:style>
+        <p:txBody>
+          <a:bodyPr rtlCol="0" anchor="ctr"/>
+          <a:lstStyle/>
+          <a:p>
+            <a:pPr algn="ctr"/>
+            <a:r>
+              <a:rPr lang="en-US" sz="1050" b="1" dirty="0" err="1">
+                <a:solidFill>
+                  <a:schemeClr val="accent6">
+                    <a:lumMod val="75000"/>
+                  </a:schemeClr>
+                </a:solidFill>
+              </a:rPr>
+              <a:t>XmlSerializable</a:t>
+            </a:r>
+            <a:br>
+              <a:rPr lang="en-US" sz="1050" b="1" dirty="0">
+                <a:solidFill>
+                  <a:schemeClr val="accent6">
+                    <a:lumMod val="75000"/>
+                  </a:schemeClr>
+                </a:solidFill>
+              </a:rPr>
+            </a:br>
+            <a:r>
+              <a:rPr lang="en-US" sz="1050" b="1" dirty="0">
+                <a:solidFill>
+                  <a:schemeClr val="accent6">
+                    <a:lumMod val="75000"/>
+                  </a:schemeClr>
+                </a:solidFill>
+              </a:rPr>
+              <a:t>Users</a:t>
+            </a:r>
+            <a:endParaRPr lang="en-SG" sz="1050" b="1" dirty="0">
+              <a:solidFill>
+                <a:schemeClr val="accent6">
+                  <a:lumMod val="75000"/>
+                </a:schemeClr>
+              </a:solidFill>
+            </a:endParaRPr>
+          </a:p>
+        </p:txBody>
+      </p:sp>
+      <p:sp>
+        <p:nvSpPr>
+          <p:cNvPr id="71" name="Rectangle 8">
+            <a:extLst>
+              <a:ext uri="{FF2B5EF4-FFF2-40B4-BE49-F238E27FC236}">
+                <a16:creationId xmlns:a16="http://schemas.microsoft.com/office/drawing/2014/main" id="{0EF4C7CA-2774-4873-AA18-4F65BFF07661}"/>
+              </a:ext>
+            </a:extLst>
+          </p:cNvPr>
+          <p:cNvSpPr/>
+          <p:nvPr/>
+        </p:nvSpPr>
+        <p:spPr>
+          <a:xfrm>
+            <a:off x="6702288" y="4443042"/>
+            <a:ext cx="1259718" cy="346760"/>
+          </a:xfrm>
+          <a:prstGeom prst="rect">
+            <a:avLst/>
+          </a:prstGeom>
+          <a:ln w="19050"/>
+          <a:effectLst/>
+        </p:spPr>
+        <p:style>
+          <a:lnRef idx="1">
+            <a:schemeClr val="accent6"/>
+          </a:lnRef>
+          <a:fillRef idx="2">
+            <a:schemeClr val="accent6"/>
+          </a:fillRef>
+          <a:effectRef idx="1">
+            <a:schemeClr val="accent6"/>
+          </a:effectRef>
+          <a:fontRef idx="minor">
+            <a:schemeClr val="dk1"/>
+          </a:fontRef>
+        </p:style>
+        <p:txBody>
+          <a:bodyPr rtlCol="0" anchor="ctr"/>
+          <a:lstStyle/>
+          <a:p>
+            <a:pPr algn="ctr"/>
+            <a:r>
+              <a:rPr lang="en-US" sz="1050" b="1" dirty="0" err="1">
+                <a:solidFill>
+                  <a:schemeClr val="accent6">
+                    <a:lumMod val="75000"/>
+                  </a:schemeClr>
+                </a:solidFill>
+              </a:rPr>
+              <a:t>XmlAdaptedUser</a:t>
+            </a:r>
+            <a:endParaRPr lang="en-SG" sz="1050" b="1" dirty="0">
+              <a:solidFill>
+                <a:schemeClr val="accent6">
+                  <a:lumMod val="75000"/>
+                </a:schemeClr>
+              </a:solidFill>
+            </a:endParaRPr>
+          </a:p>
+        </p:txBody>
+      </p:sp>
+      <p:cxnSp>
+        <p:nvCxnSpPr>
+          <p:cNvPr id="100" name="Elbow Connector 122">
+            <a:extLst>
+              <a:ext uri="{FF2B5EF4-FFF2-40B4-BE49-F238E27FC236}">
+                <a16:creationId xmlns:a16="http://schemas.microsoft.com/office/drawing/2014/main" id="{026C915B-20D2-46C9-97BA-2DFBC89BD052}"/>
+              </a:ext>
+            </a:extLst>
+          </p:cNvPr>
+          <p:cNvCxnSpPr>
+            <a:cxnSpLocks/>
+          </p:cNvCxnSpPr>
+          <p:nvPr/>
+        </p:nvCxnSpPr>
+        <p:spPr>
+          <a:xfrm rot="10800000" flipV="1">
+            <a:off x="3352912" y="4210145"/>
+            <a:ext cx="3264004" cy="232314"/>
+          </a:xfrm>
+          <a:prstGeom prst="bentConnector3">
+            <a:avLst>
+              <a:gd name="adj1" fmla="val 99959"/>
+            </a:avLst>
+          </a:prstGeom>
+          <a:ln w="19050">
+            <a:prstDash val="sysDot"/>
+            <a:headEnd type="none" w="med" len="med"/>
+            <a:tailEnd type="arrow" w="med" len="med"/>
+          </a:ln>
+          <a:effectLst/>
+        </p:spPr>
+        <p:style>
+          <a:lnRef idx="1">
+            <a:schemeClr val="accent6"/>
+          </a:lnRef>
+          <a:fillRef idx="2">
+            <a:schemeClr val="accent6"/>
+          </a:fillRef>
+          <a:effectRef idx="1">
+            <a:schemeClr val="accent6"/>
+          </a:effectRef>
+          <a:fontRef idx="minor">
+            <a:schemeClr val="dk1"/>
+          </a:fontRef>
+        </p:style>
+      </p:cxnSp>
+      <p:sp>
+        <p:nvSpPr>
+          <p:cNvPr id="101" name="Rectangle 8">
+            <a:extLst>
+              <a:ext uri="{FF2B5EF4-FFF2-40B4-BE49-F238E27FC236}">
+                <a16:creationId xmlns:a16="http://schemas.microsoft.com/office/drawing/2014/main" id="{2ECBE58E-8FE1-4681-A904-132EFCDD2999}"/>
+              </a:ext>
+            </a:extLst>
+          </p:cNvPr>
+          <p:cNvSpPr/>
+          <p:nvPr/>
+        </p:nvSpPr>
+        <p:spPr>
+          <a:xfrm>
+            <a:off x="2801638" y="4460002"/>
+            <a:ext cx="1169835" cy="346760"/>
+          </a:xfrm>
+          <a:prstGeom prst="rect">
+            <a:avLst/>
+          </a:prstGeom>
+          <a:ln w="19050"/>
+          <a:effectLst/>
+        </p:spPr>
+        <p:style>
+          <a:lnRef idx="1">
+            <a:schemeClr val="accent6"/>
+          </a:lnRef>
+          <a:fillRef idx="2">
+            <a:schemeClr val="accent6"/>
+          </a:fillRef>
+          <a:effectRef idx="1">
+            <a:schemeClr val="accent6"/>
+          </a:effectRef>
+          <a:fontRef idx="minor">
+            <a:schemeClr val="dk1"/>
+          </a:fontRef>
+        </p:style>
+        <p:txBody>
+          <a:bodyPr rtlCol="0" anchor="ctr"/>
+          <a:lstStyle/>
+          <a:p>
+            <a:pPr algn="ctr"/>
+            <a:r>
+              <a:rPr lang="en-US" sz="1050" b="1" dirty="0" err="1">
+                <a:solidFill>
+                  <a:schemeClr val="accent6">
+                    <a:lumMod val="75000"/>
+                  </a:schemeClr>
+                </a:solidFill>
+              </a:rPr>
+              <a:t>XmlAdaptedFriendship</a:t>
+            </a:r>
+            <a:endParaRPr lang="en-SG" sz="1050" b="1" dirty="0">
+              <a:solidFill>
+                <a:schemeClr val="accent6">
+                  <a:lumMod val="75000"/>
+                </a:schemeClr>
+              </a:solidFill>
+            </a:endParaRPr>
+          </a:p>
+        </p:txBody>
+      </p:sp>
+      <p:sp>
+        <p:nvSpPr>
+          <p:cNvPr id="102" name="Rectangle 8">
+            <a:extLst>
+              <a:ext uri="{FF2B5EF4-FFF2-40B4-BE49-F238E27FC236}">
+                <a16:creationId xmlns:a16="http://schemas.microsoft.com/office/drawing/2014/main" id="{BD3EDCCE-4F9A-4311-9474-0C7CE05BED25}"/>
+              </a:ext>
+            </a:extLst>
+          </p:cNvPr>
+          <p:cNvSpPr/>
+          <p:nvPr/>
+        </p:nvSpPr>
+        <p:spPr>
+          <a:xfrm>
+            <a:off x="4101986" y="4451213"/>
+            <a:ext cx="1169835" cy="346760"/>
+          </a:xfrm>
+          <a:prstGeom prst="rect">
+            <a:avLst/>
+          </a:prstGeom>
+          <a:ln w="19050"/>
+          <a:effectLst/>
+        </p:spPr>
+        <p:style>
+          <a:lnRef idx="1">
+            <a:schemeClr val="accent6"/>
+          </a:lnRef>
+          <a:fillRef idx="2">
+            <a:schemeClr val="accent6"/>
+          </a:fillRef>
+          <a:effectRef idx="1">
+            <a:schemeClr val="accent6"/>
+          </a:effectRef>
+          <a:fontRef idx="minor">
+            <a:schemeClr val="dk1"/>
+          </a:fontRef>
+        </p:style>
+        <p:txBody>
+          <a:bodyPr rtlCol="0" anchor="ctr"/>
+          <a:lstStyle/>
+          <a:p>
+            <a:pPr algn="ctr"/>
+            <a:r>
+              <a:rPr lang="en-US" sz="1050" b="1" dirty="0" err="1">
+                <a:solidFill>
+                  <a:schemeClr val="accent6">
+                    <a:lumMod val="75000"/>
+                  </a:schemeClr>
+                </a:solidFill>
+              </a:rPr>
+              <a:t>XmlAdaptedJio</a:t>
+            </a:r>
+            <a:endParaRPr lang="en-SG" sz="1050" b="1" dirty="0">
+              <a:solidFill>
+                <a:schemeClr val="accent6">
+                  <a:lumMod val="75000"/>
+                </a:schemeClr>
+              </a:solidFill>
+            </a:endParaRPr>
+          </a:p>
+        </p:txBody>
+      </p:sp>
+      <p:sp>
+        <p:nvSpPr>
+          <p:cNvPr id="103" name="Rectangle 8">
+            <a:extLst>
+              <a:ext uri="{FF2B5EF4-FFF2-40B4-BE49-F238E27FC236}">
+                <a16:creationId xmlns:a16="http://schemas.microsoft.com/office/drawing/2014/main" id="{CA42AD18-DC10-4BA4-87E3-0592DAEFD80B}"/>
+              </a:ext>
+            </a:extLst>
+          </p:cNvPr>
+          <p:cNvSpPr/>
+          <p:nvPr/>
+        </p:nvSpPr>
+        <p:spPr>
+          <a:xfrm>
+            <a:off x="5402334" y="4451213"/>
+            <a:ext cx="1169835" cy="346760"/>
+          </a:xfrm>
+          <a:prstGeom prst="rect">
+            <a:avLst/>
+          </a:prstGeom>
+          <a:ln w="19050"/>
+          <a:effectLst/>
+        </p:spPr>
+        <p:style>
+          <a:lnRef idx="1">
+            <a:schemeClr val="accent6"/>
+          </a:lnRef>
+          <a:fillRef idx="2">
+            <a:schemeClr val="accent6"/>
+          </a:fillRef>
+          <a:effectRef idx="1">
+            <a:schemeClr val="accent6"/>
+          </a:effectRef>
+          <a:fontRef idx="minor">
+            <a:schemeClr val="dk1"/>
+          </a:fontRef>
+        </p:style>
+        <p:txBody>
+          <a:bodyPr rtlCol="0" anchor="ctr"/>
+          <a:lstStyle/>
+          <a:p>
+            <a:pPr algn="ctr"/>
+            <a:r>
+              <a:rPr lang="en-US" sz="1050" b="1" dirty="0" err="1">
+                <a:solidFill>
+                  <a:schemeClr val="accent6">
+                    <a:lumMod val="75000"/>
+                  </a:schemeClr>
+                </a:solidFill>
+              </a:rPr>
+              <a:t>XmlAdaptedDebt</a:t>
+            </a:r>
+            <a:endParaRPr lang="en-SG" sz="1050" b="1" dirty="0">
+              <a:solidFill>
+                <a:schemeClr val="accent6">
+                  <a:lumMod val="75000"/>
+                </a:schemeClr>
+              </a:solidFill>
+            </a:endParaRPr>
+          </a:p>
+        </p:txBody>
+      </p:sp>
+      <p:cxnSp>
+        <p:nvCxnSpPr>
+          <p:cNvPr id="104" name="Elbow Connector 122">
+            <a:extLst>
+              <a:ext uri="{FF2B5EF4-FFF2-40B4-BE49-F238E27FC236}">
+                <a16:creationId xmlns:a16="http://schemas.microsoft.com/office/drawing/2014/main" id="{960C810F-A146-4ADE-99FF-69946BFB0E53}"/>
+              </a:ext>
+            </a:extLst>
+          </p:cNvPr>
+          <p:cNvCxnSpPr>
+            <a:cxnSpLocks/>
+          </p:cNvCxnSpPr>
+          <p:nvPr/>
+        </p:nvCxnSpPr>
+        <p:spPr>
+          <a:xfrm rot="10800000" flipV="1">
+            <a:off x="4724459" y="4208174"/>
+            <a:ext cx="1885262" cy="234283"/>
+          </a:xfrm>
+          <a:prstGeom prst="bentConnector3">
+            <a:avLst>
+              <a:gd name="adj1" fmla="val 100119"/>
+            </a:avLst>
+          </a:prstGeom>
+          <a:ln w="19050">
+            <a:prstDash val="sysDot"/>
+            <a:headEnd type="none" w="med" len="med"/>
+            <a:tailEnd type="arrow" w="med" len="med"/>
+          </a:ln>
+          <a:effectLst/>
+        </p:spPr>
+        <p:style>
+          <a:lnRef idx="1">
+            <a:schemeClr val="accent6"/>
+          </a:lnRef>
+          <a:fillRef idx="2">
+            <a:schemeClr val="accent6"/>
+          </a:fillRef>
+          <a:effectRef idx="1">
+            <a:schemeClr val="accent6"/>
+          </a:effectRef>
+          <a:fontRef idx="minor">
+            <a:schemeClr val="dk1"/>
+          </a:fontRef>
+        </p:style>
+      </p:cxnSp>
+      <p:cxnSp>
+        <p:nvCxnSpPr>
+          <p:cNvPr id="106" name="Elbow Connector 122">
+            <a:extLst>
+              <a:ext uri="{FF2B5EF4-FFF2-40B4-BE49-F238E27FC236}">
+                <a16:creationId xmlns:a16="http://schemas.microsoft.com/office/drawing/2014/main" id="{709383B5-1681-451D-BCA9-20E9F2C0E2A3}"/>
+              </a:ext>
+            </a:extLst>
+          </p:cNvPr>
+          <p:cNvCxnSpPr>
+            <a:cxnSpLocks/>
+          </p:cNvCxnSpPr>
+          <p:nvPr/>
+        </p:nvCxnSpPr>
+        <p:spPr>
+          <a:xfrm rot="10800000" flipV="1">
+            <a:off x="6016564" y="4206202"/>
+            <a:ext cx="536639" cy="216917"/>
+          </a:xfrm>
+          <a:prstGeom prst="bentConnector3">
+            <a:avLst>
+              <a:gd name="adj1" fmla="val 99698"/>
+            </a:avLst>
+          </a:prstGeom>
+          <a:ln w="19050">
+            <a:prstDash val="sysDot"/>
+            <a:headEnd type="none" w="med" len="med"/>
+            <a:tailEnd type="arrow" w="med" len="med"/>
+          </a:ln>
+          <a:effectLst/>
+        </p:spPr>
+        <p:style>
+          <a:lnRef idx="1">
+            <a:schemeClr val="accent6"/>
+          </a:lnRef>
+          <a:fillRef idx="2">
+            <a:schemeClr val="accent6"/>
+          </a:fillRef>
+          <a:effectRef idx="1">
+            <a:schemeClr val="accent6"/>
+          </a:effectRef>
+          <a:fontRef idx="minor">
+            <a:schemeClr val="dk1"/>
+          </a:fontRef>
+        </p:style>
+      </p:cxnSp>
+      <p:cxnSp>
+        <p:nvCxnSpPr>
+          <p:cNvPr id="121" name="Elbow Connector 122">
+            <a:extLst>
+              <a:ext uri="{FF2B5EF4-FFF2-40B4-BE49-F238E27FC236}">
+                <a16:creationId xmlns:a16="http://schemas.microsoft.com/office/drawing/2014/main" id="{B58AEB45-3159-4170-A713-C768940D8BD2}"/>
+              </a:ext>
+            </a:extLst>
+          </p:cNvPr>
+          <p:cNvCxnSpPr>
+            <a:cxnSpLocks/>
+          </p:cNvCxnSpPr>
+          <p:nvPr/>
+        </p:nvCxnSpPr>
+        <p:spPr>
+          <a:xfrm>
+            <a:off x="6616916" y="4206202"/>
+            <a:ext cx="748272" cy="216917"/>
+          </a:xfrm>
+          <a:prstGeom prst="bentConnector3">
+            <a:avLst>
+              <a:gd name="adj1" fmla="val 99899"/>
+            </a:avLst>
+          </a:prstGeom>
+          <a:ln w="19050">
+            <a:prstDash val="sysDot"/>
+            <a:headEnd type="none" w="med" len="med"/>
+            <a:tailEnd type="arrow" w="med" len="med"/>
+          </a:ln>
+          <a:effectLst/>
+        </p:spPr>
+        <p:style>
+          <a:lnRef idx="1">
+            <a:schemeClr val="accent6"/>
+          </a:lnRef>
+          <a:fillRef idx="2">
+            <a:schemeClr val="accent6"/>
+          </a:fillRef>
+          <a:effectRef idx="1">
+            <a:schemeClr val="accent6"/>
+          </a:effectRef>
+          <a:fontRef idx="minor">
+            <a:schemeClr val="dk1"/>
+          </a:fontRef>
+        </p:style>
+      </p:cxnSp>
+      <p:cxnSp>
+        <p:nvCxnSpPr>
+          <p:cNvPr id="122" name="Elbow Connector 122">
+            <a:extLst>
+              <a:ext uri="{FF2B5EF4-FFF2-40B4-BE49-F238E27FC236}">
+                <a16:creationId xmlns:a16="http://schemas.microsoft.com/office/drawing/2014/main" id="{57FF9698-3AF8-4B3F-90F5-F3B766A0E48A}"/>
+              </a:ext>
+            </a:extLst>
+          </p:cNvPr>
+          <p:cNvCxnSpPr>
+            <a:cxnSpLocks/>
+          </p:cNvCxnSpPr>
+          <p:nvPr/>
+        </p:nvCxnSpPr>
+        <p:spPr>
+          <a:xfrm rot="16200000" flipH="1">
+            <a:off x="6478137" y="4105389"/>
+            <a:ext cx="184008" cy="4060"/>
           </a:xfrm>
           <a:prstGeom prst="bentConnector3">
             <a:avLst>
@@ -4843,13 +5805,6 @@
   <p:clrMapOvr>
     <a:masterClrMapping/>
   </p:clrMapOvr>
-  <p:timing>
-    <p:tnLst>
-      <p:par>
-        <p:cTn id="1" dur="indefinite" restart="never" nodeType="tmRoot"/>
-      </p:par>
-    </p:tnLst>
-  </p:timing>
 </p:sld>
 </file>
 

</xml_diff>

<commit_message>
Updated Documentation. UserGuide and Developer Guide.
</commit_message>
<xml_diff>
--- a/docs/diagrams/StorageComponentClassDiagram.pptx
+++ b/docs/diagrams/StorageComponentClassDiagram.pptx
@@ -208,7 +208,7 @@
           <a:p>
             <a:fld id="{F5CC4B3F-88C1-4FFA-B1B6-F41C21DC6924}" type="datetimeFigureOut">
               <a:rPr lang="en-US" smtClean="0"/>
-              <a:t>10/13/2018</a:t>
+              <a:t>10/28/2018</a:t>
             </a:fld>
             <a:endParaRPr lang="en-US"/>
           </a:p>
@@ -654,7 +654,7 @@
           <a:p>
             <a:fld id="{78C97017-6FC3-485B-9764-EAC9E56C1D49}" type="datetimeFigureOut">
               <a:rPr lang="en-US" smtClean="0"/>
-              <a:t>10/13/2018</a:t>
+              <a:t>10/28/2018</a:t>
             </a:fld>
             <a:endParaRPr lang="en-US"/>
           </a:p>
@@ -822,7 +822,7 @@
           <a:p>
             <a:fld id="{78C97017-6FC3-485B-9764-EAC9E56C1D49}" type="datetimeFigureOut">
               <a:rPr lang="en-US" smtClean="0"/>
-              <a:t>10/13/2018</a:t>
+              <a:t>10/28/2018</a:t>
             </a:fld>
             <a:endParaRPr lang="en-US"/>
           </a:p>
@@ -1000,7 +1000,7 @@
           <a:p>
             <a:fld id="{78C97017-6FC3-485B-9764-EAC9E56C1D49}" type="datetimeFigureOut">
               <a:rPr lang="en-US" smtClean="0"/>
-              <a:t>10/13/2018</a:t>
+              <a:t>10/28/2018</a:t>
             </a:fld>
             <a:endParaRPr lang="en-US"/>
           </a:p>
@@ -1168,7 +1168,7 @@
           <a:p>
             <a:fld id="{78C97017-6FC3-485B-9764-EAC9E56C1D49}" type="datetimeFigureOut">
               <a:rPr lang="en-US" smtClean="0"/>
-              <a:t>10/13/2018</a:t>
+              <a:t>10/28/2018</a:t>
             </a:fld>
             <a:endParaRPr lang="en-US"/>
           </a:p>
@@ -1413,7 +1413,7 @@
           <a:p>
             <a:fld id="{78C97017-6FC3-485B-9764-EAC9E56C1D49}" type="datetimeFigureOut">
               <a:rPr lang="en-US" smtClean="0"/>
-              <a:t>10/13/2018</a:t>
+              <a:t>10/28/2018</a:t>
             </a:fld>
             <a:endParaRPr lang="en-US"/>
           </a:p>
@@ -1698,7 +1698,7 @@
           <a:p>
             <a:fld id="{78C97017-6FC3-485B-9764-EAC9E56C1D49}" type="datetimeFigureOut">
               <a:rPr lang="en-US" smtClean="0"/>
-              <a:t>10/13/2018</a:t>
+              <a:t>10/28/2018</a:t>
             </a:fld>
             <a:endParaRPr lang="en-US"/>
           </a:p>
@@ -2117,7 +2117,7 @@
           <a:p>
             <a:fld id="{78C97017-6FC3-485B-9764-EAC9E56C1D49}" type="datetimeFigureOut">
               <a:rPr lang="en-US" smtClean="0"/>
-              <a:t>10/13/2018</a:t>
+              <a:t>10/28/2018</a:t>
             </a:fld>
             <a:endParaRPr lang="en-US"/>
           </a:p>
@@ -2234,7 +2234,7 @@
           <a:p>
             <a:fld id="{78C97017-6FC3-485B-9764-EAC9E56C1D49}" type="datetimeFigureOut">
               <a:rPr lang="en-US" smtClean="0"/>
-              <a:t>10/13/2018</a:t>
+              <a:t>10/28/2018</a:t>
             </a:fld>
             <a:endParaRPr lang="en-US"/>
           </a:p>
@@ -2329,7 +2329,7 @@
           <a:p>
             <a:fld id="{78C97017-6FC3-485B-9764-EAC9E56C1D49}" type="datetimeFigureOut">
               <a:rPr lang="en-US" smtClean="0"/>
-              <a:t>10/13/2018</a:t>
+              <a:t>10/28/2018</a:t>
             </a:fld>
             <a:endParaRPr lang="en-US"/>
           </a:p>
@@ -2604,7 +2604,7 @@
           <a:p>
             <a:fld id="{78C97017-6FC3-485B-9764-EAC9E56C1D49}" type="datetimeFigureOut">
               <a:rPr lang="en-US" smtClean="0"/>
-              <a:t>10/13/2018</a:t>
+              <a:t>10/28/2018</a:t>
             </a:fld>
             <a:endParaRPr lang="en-US"/>
           </a:p>
@@ -2856,7 +2856,7 @@
           <a:p>
             <a:fld id="{78C97017-6FC3-485B-9764-EAC9E56C1D49}" type="datetimeFigureOut">
               <a:rPr lang="en-US" smtClean="0"/>
-              <a:t>10/13/2018</a:t>
+              <a:t>10/28/2018</a:t>
             </a:fld>
             <a:endParaRPr lang="en-US"/>
           </a:p>
@@ -3067,7 +3067,7 @@
           <a:p>
             <a:fld id="{78C97017-6FC3-485B-9764-EAC9E56C1D49}" type="datetimeFigureOut">
               <a:rPr lang="en-US" smtClean="0"/>
-              <a:t>10/13/2018</a:t>
+              <a:t>10/28/2018</a:t>
             </a:fld>
             <a:endParaRPr lang="en-US"/>
           </a:p>
@@ -3570,7 +3570,7 @@
               </a:rPr>
             </a:br>
             <a:r>
-              <a:rPr lang="en-US" sz="1050" dirty="0" err="1">
+              <a:rPr lang="en-US" sz="1050" dirty="0">
                 <a:solidFill>
                   <a:schemeClr val="bg1"/>
                 </a:solidFill>
@@ -3633,7 +3633,7 @@
           <a:p>
             <a:pPr algn="ctr"/>
             <a:r>
-              <a:rPr lang="en-US" sz="1050" dirty="0" err="1">
+              <a:rPr lang="en-US" sz="1050" dirty="0">
                 <a:solidFill>
                   <a:schemeClr val="bg1"/>
                 </a:solidFill>
@@ -4141,7 +4141,7 @@
           <a:p>
             <a:pPr algn="ctr"/>
             <a:r>
-              <a:rPr lang="en-US" sz="1050" b="1" dirty="0" err="1">
+              <a:rPr lang="en-US" sz="1050" b="1" dirty="0">
                 <a:solidFill>
                   <a:schemeClr val="accent6">
                     <a:lumMod val="75000"/>
@@ -4242,7 +4242,7 @@
               </a:rPr>
             </a:br>
             <a:r>
-              <a:rPr lang="en-US" sz="1050" dirty="0" err="1">
+              <a:rPr lang="en-US" sz="1050" dirty="0">
                 <a:solidFill>
                   <a:schemeClr val="bg1"/>
                 </a:solidFill>
@@ -4500,7 +4500,7 @@
           <a:p>
             <a:pPr algn="ctr"/>
             <a:r>
-              <a:rPr lang="en-US" sz="1050" dirty="0" err="1">
+              <a:rPr lang="en-US" sz="1050" dirty="0">
                 <a:solidFill>
                   <a:schemeClr val="bg1"/>
                 </a:solidFill>
@@ -4567,7 +4567,7 @@
           <a:p>
             <a:pPr algn="ctr"/>
             <a:r>
-              <a:rPr lang="en-US" sz="1050" b="1" dirty="0" err="1">
+              <a:rPr lang="en-US" sz="1050" b="1" dirty="0">
                 <a:solidFill>
                   <a:schemeClr val="accent6">
                     <a:lumMod val="75000"/>
@@ -4586,7 +4586,7 @@
               </a:rPr>
             </a:br>
             <a:r>
-              <a:rPr lang="en-US" sz="1050" b="1" dirty="0" err="1">
+              <a:rPr lang="en-US" sz="1050" b="1" dirty="0">
                 <a:solidFill>
                   <a:schemeClr val="accent6">
                     <a:lumMod val="75000"/>
@@ -4609,15 +4609,16 @@
         <p:nvCxnSpPr>
           <p:cNvPr id="70" name="Elbow Connector 122"/>
           <p:cNvCxnSpPr>
-            <a:stCxn id="74" idx="0"/>
-            <a:endCxn id="73" idx="2"/>
+            <a:cxnSpLocks/>
+            <a:stCxn id="74" idx="2"/>
+            <a:endCxn id="73" idx="0"/>
           </p:cNvCxnSpPr>
           <p:nvPr/>
         </p:nvCxnSpPr>
         <p:spPr>
-          <a:xfrm rot="5400000" flipH="1" flipV="1">
-            <a:off x="8133756" y="3047783"/>
-            <a:ext cx="223683" cy="12700"/>
+          <a:xfrm rot="5400000">
+            <a:off x="8113896" y="3637509"/>
+            <a:ext cx="262826" cy="576"/>
           </a:xfrm>
           <a:prstGeom prst="bentConnector3">
             <a:avLst>
@@ -4654,7 +4655,7 @@
         </p:nvSpPr>
         <p:spPr>
           <a:xfrm>
-            <a:off x="7615738" y="2589181"/>
+            <a:off x="7615162" y="3769210"/>
             <a:ext cx="1259718" cy="346760"/>
           </a:xfrm>
           <a:prstGeom prst="rect">
@@ -4683,7 +4684,7 @@
           <a:p>
             <a:pPr algn="ctr"/>
             <a:r>
-              <a:rPr lang="en-US" sz="1050" b="1" dirty="0" err="1">
+              <a:rPr lang="en-US" sz="1050" b="1" dirty="0">
                 <a:solidFill>
                   <a:schemeClr val="accent6">
                     <a:lumMod val="75000"/>
@@ -4739,7 +4740,7 @@
           <a:p>
             <a:pPr algn="ctr"/>
             <a:r>
-              <a:rPr lang="en-US" sz="1050" b="1" dirty="0" err="1">
+              <a:rPr lang="en-US" sz="1050" b="1" dirty="0">
                 <a:solidFill>
                   <a:schemeClr val="accent6">
                     <a:lumMod val="75000"/>
@@ -4748,13 +4749,6 @@
               </a:rPr>
               <a:t>XmlAdapted</a:t>
             </a:r>
-            <a:endParaRPr lang="en-US" sz="1050" b="1" dirty="0">
-              <a:solidFill>
-                <a:schemeClr val="accent6">
-                  <a:lumMod val="75000"/>
-                </a:schemeClr>
-              </a:solidFill>
-            </a:endParaRPr>
           </a:p>
           <a:p>
             <a:pPr algn="ctr"/>
@@ -4888,7 +4882,7 @@
               </a:rPr>
             </a:br>
             <a:r>
-              <a:rPr lang="en-US" sz="1050" dirty="0" err="1">
+              <a:rPr lang="en-US" sz="1050" dirty="0">
                 <a:solidFill>
                   <a:schemeClr val="bg1"/>
                 </a:solidFill>
@@ -5217,7 +5211,7 @@
           <a:p>
             <a:pPr algn="ctr"/>
             <a:r>
-              <a:rPr lang="en-US" sz="1050" b="1" dirty="0" err="1">
+              <a:rPr lang="en-US" sz="1050" b="1" dirty="0">
                 <a:solidFill>
                   <a:schemeClr val="accent6">
                     <a:lumMod val="75000"/>
@@ -5279,7 +5273,7 @@
           <a:p>
             <a:pPr algn="ctr"/>
             <a:r>
-              <a:rPr lang="en-US" sz="1050" b="1" dirty="0" err="1">
+              <a:rPr lang="en-US" sz="1050" b="1" dirty="0">
                 <a:solidFill>
                   <a:schemeClr val="accent6">
                     <a:lumMod val="75000"/>
@@ -5360,14 +5354,27 @@
           <a:p>
             <a:pPr algn="ctr"/>
             <a:r>
-              <a:rPr lang="en-US" sz="1050" b="1" dirty="0" err="1">
+              <a:rPr lang="en-US" sz="1050" b="1" dirty="0">
                 <a:solidFill>
                   <a:schemeClr val="accent6">
                     <a:lumMod val="75000"/>
                   </a:schemeClr>
                 </a:solidFill>
               </a:rPr>
-              <a:t>XmlAdaptedUser</a:t>
+              <a:t>XmlAdapted</a:t>
+            </a:r>
+          </a:p>
+          <a:p>
+            <a:pPr algn="ctr"/>
+            <a:r>
+              <a:rPr lang="en-US" sz="1050" b="1" dirty="0">
+                <a:solidFill>
+                  <a:schemeClr val="accent6">
+                    <a:lumMod val="75000"/>
+                  </a:schemeClr>
+                </a:solidFill>
+              </a:rPr>
+              <a:t>User</a:t>
             </a:r>
             <a:endParaRPr lang="en-SG" sz="1050" b="1" dirty="0">
               <a:solidFill>
@@ -5468,14 +5475,27 @@
           <a:p>
             <a:pPr algn="ctr"/>
             <a:r>
-              <a:rPr lang="en-US" sz="1050" b="1" dirty="0" err="1">
+              <a:rPr lang="en-US" sz="1050" b="1" dirty="0">
                 <a:solidFill>
                   <a:schemeClr val="accent6">
                     <a:lumMod val="75000"/>
                   </a:schemeClr>
                 </a:solidFill>
               </a:rPr>
-              <a:t>XmlAdaptedFriendship</a:t>
+              <a:t>XmlAdapted</a:t>
+            </a:r>
+          </a:p>
+          <a:p>
+            <a:pPr algn="ctr"/>
+            <a:r>
+              <a:rPr lang="en-US" sz="1050" b="1" dirty="0">
+                <a:solidFill>
+                  <a:schemeClr val="accent6">
+                    <a:lumMod val="75000"/>
+                  </a:schemeClr>
+                </a:solidFill>
+              </a:rPr>
+              <a:t>Friendship</a:t>
             </a:r>
             <a:endParaRPr lang="en-SG" sz="1050" b="1" dirty="0">
               <a:solidFill>
@@ -5530,14 +5550,27 @@
           <a:p>
             <a:pPr algn="ctr"/>
             <a:r>
-              <a:rPr lang="en-US" sz="1050" b="1" dirty="0" err="1">
+              <a:rPr lang="en-US" sz="1050" b="1" dirty="0">
                 <a:solidFill>
                   <a:schemeClr val="accent6">
                     <a:lumMod val="75000"/>
                   </a:schemeClr>
                 </a:solidFill>
               </a:rPr>
-              <a:t>XmlAdaptedJio</a:t>
+              <a:t>XmlAdapted</a:t>
+            </a:r>
+          </a:p>
+          <a:p>
+            <a:pPr algn="ctr"/>
+            <a:r>
+              <a:rPr lang="en-US" sz="1050" b="1" dirty="0">
+                <a:solidFill>
+                  <a:schemeClr val="accent6">
+                    <a:lumMod val="75000"/>
+                  </a:schemeClr>
+                </a:solidFill>
+              </a:rPr>
+              <a:t>Jio</a:t>
             </a:r>
             <a:endParaRPr lang="en-SG" sz="1050" b="1" dirty="0">
               <a:solidFill>
@@ -5592,14 +5625,27 @@
           <a:p>
             <a:pPr algn="ctr"/>
             <a:r>
-              <a:rPr lang="en-US" sz="1050" b="1" dirty="0" err="1">
+              <a:rPr lang="en-US" sz="1050" b="1" dirty="0">
                 <a:solidFill>
                   <a:schemeClr val="accent6">
                     <a:lumMod val="75000"/>
                   </a:schemeClr>
                 </a:solidFill>
               </a:rPr>
-              <a:t>XmlAdaptedDebt</a:t>
+              <a:t>XmlAdapted</a:t>
+            </a:r>
+          </a:p>
+          <a:p>
+            <a:pPr algn="ctr"/>
+            <a:r>
+              <a:rPr lang="en-US" sz="1050" b="1" dirty="0">
+                <a:solidFill>
+                  <a:schemeClr val="accent6">
+                    <a:lumMod val="75000"/>
+                  </a:schemeClr>
+                </a:solidFill>
+              </a:rPr>
+              <a:t>Debt</a:t>
             </a:r>
             <a:endParaRPr lang="en-SG" sz="1050" b="1" dirty="0">
               <a:solidFill>
@@ -5767,6 +5813,252 @@
           <a:xfrm rot="16200000" flipH="1">
             <a:off x="6478137" y="4105389"/>
             <a:ext cx="184008" cy="4060"/>
+          </a:xfrm>
+          <a:prstGeom prst="bentConnector3">
+            <a:avLst>
+              <a:gd name="adj1" fmla="val 50000"/>
+            </a:avLst>
+          </a:prstGeom>
+          <a:ln w="19050">
+            <a:prstDash val="sysDot"/>
+            <a:headEnd type="none" w="med" len="med"/>
+            <a:tailEnd type="arrow" w="med" len="med"/>
+          </a:ln>
+          <a:effectLst/>
+        </p:spPr>
+        <p:style>
+          <a:lnRef idx="1">
+            <a:schemeClr val="accent6"/>
+          </a:lnRef>
+          <a:fillRef idx="2">
+            <a:schemeClr val="accent6"/>
+          </a:fillRef>
+          <a:effectRef idx="1">
+            <a:schemeClr val="accent6"/>
+          </a:effectRef>
+          <a:fontRef idx="minor">
+            <a:schemeClr val="dk1"/>
+          </a:fontRef>
+        </p:style>
+      </p:cxnSp>
+      <p:sp>
+        <p:nvSpPr>
+          <p:cNvPr id="55" name="Rectangle 8">
+            <a:extLst>
+              <a:ext uri="{FF2B5EF4-FFF2-40B4-BE49-F238E27FC236}">
+                <a16:creationId xmlns:a16="http://schemas.microsoft.com/office/drawing/2014/main" id="{96DEF2F1-8747-4D62-AAF3-574BED3B654B}"/>
+              </a:ext>
+            </a:extLst>
+          </p:cNvPr>
+          <p:cNvSpPr/>
+          <p:nvPr/>
+        </p:nvSpPr>
+        <p:spPr>
+          <a:xfrm>
+            <a:off x="7615162" y="2535129"/>
+            <a:ext cx="1259718" cy="346760"/>
+          </a:xfrm>
+          <a:prstGeom prst="rect">
+            <a:avLst/>
+          </a:prstGeom>
+          <a:ln w="19050"/>
+          <a:effectLst/>
+        </p:spPr>
+        <p:style>
+          <a:lnRef idx="1">
+            <a:schemeClr val="accent6"/>
+          </a:lnRef>
+          <a:fillRef idx="2">
+            <a:schemeClr val="accent6"/>
+          </a:fillRef>
+          <a:effectRef idx="1">
+            <a:schemeClr val="accent6"/>
+          </a:effectRef>
+          <a:fontRef idx="minor">
+            <a:schemeClr val="dk1"/>
+          </a:fontRef>
+        </p:style>
+        <p:txBody>
+          <a:bodyPr rtlCol="0" anchor="ctr"/>
+          <a:lstStyle/>
+          <a:p>
+            <a:pPr algn="ctr"/>
+            <a:r>
+              <a:rPr lang="en-US" sz="1050" b="1" dirty="0">
+                <a:solidFill>
+                  <a:schemeClr val="accent6">
+                    <a:lumMod val="75000"/>
+                  </a:schemeClr>
+                </a:solidFill>
+              </a:rPr>
+              <a:t>XmlAdapted</a:t>
+            </a:r>
+          </a:p>
+          <a:p>
+            <a:pPr algn="ctr"/>
+            <a:r>
+              <a:rPr lang="en-US" sz="1050" b="1" dirty="0">
+                <a:solidFill>
+                  <a:schemeClr val="accent6">
+                    <a:lumMod val="75000"/>
+                  </a:schemeClr>
+                </a:solidFill>
+              </a:rPr>
+              <a:t>Reviews</a:t>
+            </a:r>
+            <a:endParaRPr lang="en-SG" sz="1050" b="1" dirty="0">
+              <a:solidFill>
+                <a:schemeClr val="accent6">
+                  <a:lumMod val="75000"/>
+                </a:schemeClr>
+              </a:solidFill>
+            </a:endParaRPr>
+          </a:p>
+        </p:txBody>
+      </p:sp>
+      <p:sp>
+        <p:nvSpPr>
+          <p:cNvPr id="57" name="Rectangle 8">
+            <a:extLst>
+              <a:ext uri="{FF2B5EF4-FFF2-40B4-BE49-F238E27FC236}">
+                <a16:creationId xmlns:a16="http://schemas.microsoft.com/office/drawing/2014/main" id="{1D62ED43-BEB3-44F3-8F46-562050376ECB}"/>
+              </a:ext>
+            </a:extLst>
+          </p:cNvPr>
+          <p:cNvSpPr/>
+          <p:nvPr/>
+        </p:nvSpPr>
+        <p:spPr>
+          <a:xfrm>
+            <a:off x="6002328" y="2541243"/>
+            <a:ext cx="1259718" cy="346760"/>
+          </a:xfrm>
+          <a:prstGeom prst="rect">
+            <a:avLst/>
+          </a:prstGeom>
+          <a:ln w="19050"/>
+          <a:effectLst/>
+        </p:spPr>
+        <p:style>
+          <a:lnRef idx="1">
+            <a:schemeClr val="accent6"/>
+          </a:lnRef>
+          <a:fillRef idx="2">
+            <a:schemeClr val="accent6"/>
+          </a:fillRef>
+          <a:effectRef idx="1">
+            <a:schemeClr val="accent6"/>
+          </a:effectRef>
+          <a:fontRef idx="minor">
+            <a:schemeClr val="dk1"/>
+          </a:fontRef>
+        </p:style>
+        <p:txBody>
+          <a:bodyPr rtlCol="0" anchor="ctr"/>
+          <a:lstStyle/>
+          <a:p>
+            <a:pPr algn="ctr"/>
+            <a:r>
+              <a:rPr lang="en-US" sz="1050" b="1" dirty="0">
+                <a:solidFill>
+                  <a:schemeClr val="accent6">
+                    <a:lumMod val="75000"/>
+                  </a:schemeClr>
+                </a:solidFill>
+              </a:rPr>
+              <a:t>XmlAdapted</a:t>
+            </a:r>
+          </a:p>
+          <a:p>
+            <a:pPr algn="ctr"/>
+            <a:r>
+              <a:rPr lang="en-US" sz="1050" b="1" dirty="0">
+                <a:solidFill>
+                  <a:schemeClr val="accent6">
+                    <a:lumMod val="75000"/>
+                  </a:schemeClr>
+                </a:solidFill>
+              </a:rPr>
+              <a:t>UserReviews</a:t>
+            </a:r>
+            <a:endParaRPr lang="en-SG" sz="1050" b="1" dirty="0">
+              <a:solidFill>
+                <a:schemeClr val="accent6">
+                  <a:lumMod val="75000"/>
+                </a:schemeClr>
+              </a:solidFill>
+            </a:endParaRPr>
+          </a:p>
+        </p:txBody>
+      </p:sp>
+      <p:cxnSp>
+        <p:nvCxnSpPr>
+          <p:cNvPr id="59" name="Elbow Connector 122">
+            <a:extLst>
+              <a:ext uri="{FF2B5EF4-FFF2-40B4-BE49-F238E27FC236}">
+                <a16:creationId xmlns:a16="http://schemas.microsoft.com/office/drawing/2014/main" id="{F5E8F3D7-6D35-4873-A591-DA2BDBA2E2C9}"/>
+              </a:ext>
+            </a:extLst>
+          </p:cNvPr>
+          <p:cNvCxnSpPr>
+            <a:cxnSpLocks/>
+            <a:stCxn id="55" idx="2"/>
+            <a:endCxn id="74" idx="0"/>
+          </p:cNvCxnSpPr>
+          <p:nvPr/>
+        </p:nvCxnSpPr>
+        <p:spPr>
+          <a:xfrm rot="16200000" flipH="1">
+            <a:off x="8106442" y="3020468"/>
+            <a:ext cx="277735" cy="576"/>
+          </a:xfrm>
+          <a:prstGeom prst="bentConnector3">
+            <a:avLst>
+              <a:gd name="adj1" fmla="val 50000"/>
+            </a:avLst>
+          </a:prstGeom>
+          <a:ln w="19050">
+            <a:prstDash val="sysDot"/>
+            <a:headEnd type="none" w="med" len="med"/>
+            <a:tailEnd type="arrow" w="med" len="med"/>
+          </a:ln>
+          <a:effectLst/>
+        </p:spPr>
+        <p:style>
+          <a:lnRef idx="1">
+            <a:schemeClr val="accent6"/>
+          </a:lnRef>
+          <a:fillRef idx="2">
+            <a:schemeClr val="accent6"/>
+          </a:fillRef>
+          <a:effectRef idx="1">
+            <a:schemeClr val="accent6"/>
+          </a:effectRef>
+          <a:fontRef idx="minor">
+            <a:schemeClr val="dk1"/>
+          </a:fontRef>
+        </p:style>
+      </p:cxnSp>
+      <p:cxnSp>
+        <p:nvCxnSpPr>
+          <p:cNvPr id="62" name="Elbow Connector 122">
+            <a:extLst>
+              <a:ext uri="{FF2B5EF4-FFF2-40B4-BE49-F238E27FC236}">
+                <a16:creationId xmlns:a16="http://schemas.microsoft.com/office/drawing/2014/main" id="{76AB4F4A-5B5A-41F2-B3B8-7A1A32FAA115}"/>
+              </a:ext>
+            </a:extLst>
+          </p:cNvPr>
+          <p:cNvCxnSpPr>
+            <a:cxnSpLocks/>
+            <a:stCxn id="55" idx="1"/>
+            <a:endCxn id="57" idx="3"/>
+          </p:cNvCxnSpPr>
+          <p:nvPr/>
+        </p:nvCxnSpPr>
+        <p:spPr>
+          <a:xfrm rot="10800000" flipV="1">
+            <a:off x="7262046" y="2708509"/>
+            <a:ext cx="353116" cy="6114"/>
           </a:xfrm>
           <a:prstGeom prst="bentConnector3">
             <a:avLst>

</xml_diff>

<commit_message>
Diagrams Update. Update Developer Guide and User Guide.
</commit_message>
<xml_diff>
--- a/docs/diagrams/StorageComponentClassDiagram.pptx
+++ b/docs/diagrams/StorageComponentClassDiagram.pptx
@@ -208,7 +208,7 @@
           <a:p>
             <a:fld id="{F5CC4B3F-88C1-4FFA-B1B6-F41C21DC6924}" type="datetimeFigureOut">
               <a:rPr lang="en-US" smtClean="0"/>
-              <a:t>10/28/2018</a:t>
+              <a:t>11/12/2018</a:t>
             </a:fld>
             <a:endParaRPr lang="en-US"/>
           </a:p>
@@ -654,7 +654,7 @@
           <a:p>
             <a:fld id="{78C97017-6FC3-485B-9764-EAC9E56C1D49}" type="datetimeFigureOut">
               <a:rPr lang="en-US" smtClean="0"/>
-              <a:t>10/28/2018</a:t>
+              <a:t>11/12/2018</a:t>
             </a:fld>
             <a:endParaRPr lang="en-US"/>
           </a:p>
@@ -822,7 +822,7 @@
           <a:p>
             <a:fld id="{78C97017-6FC3-485B-9764-EAC9E56C1D49}" type="datetimeFigureOut">
               <a:rPr lang="en-US" smtClean="0"/>
-              <a:t>10/28/2018</a:t>
+              <a:t>11/12/2018</a:t>
             </a:fld>
             <a:endParaRPr lang="en-US"/>
           </a:p>
@@ -1000,7 +1000,7 @@
           <a:p>
             <a:fld id="{78C97017-6FC3-485B-9764-EAC9E56C1D49}" type="datetimeFigureOut">
               <a:rPr lang="en-US" smtClean="0"/>
-              <a:t>10/28/2018</a:t>
+              <a:t>11/12/2018</a:t>
             </a:fld>
             <a:endParaRPr lang="en-US"/>
           </a:p>
@@ -1168,7 +1168,7 @@
           <a:p>
             <a:fld id="{78C97017-6FC3-485B-9764-EAC9E56C1D49}" type="datetimeFigureOut">
               <a:rPr lang="en-US" smtClean="0"/>
-              <a:t>10/28/2018</a:t>
+              <a:t>11/12/2018</a:t>
             </a:fld>
             <a:endParaRPr lang="en-US"/>
           </a:p>
@@ -1413,7 +1413,7 @@
           <a:p>
             <a:fld id="{78C97017-6FC3-485B-9764-EAC9E56C1D49}" type="datetimeFigureOut">
               <a:rPr lang="en-US" smtClean="0"/>
-              <a:t>10/28/2018</a:t>
+              <a:t>11/12/2018</a:t>
             </a:fld>
             <a:endParaRPr lang="en-US"/>
           </a:p>
@@ -1698,7 +1698,7 @@
           <a:p>
             <a:fld id="{78C97017-6FC3-485B-9764-EAC9E56C1D49}" type="datetimeFigureOut">
               <a:rPr lang="en-US" smtClean="0"/>
-              <a:t>10/28/2018</a:t>
+              <a:t>11/12/2018</a:t>
             </a:fld>
             <a:endParaRPr lang="en-US"/>
           </a:p>
@@ -2117,7 +2117,7 @@
           <a:p>
             <a:fld id="{78C97017-6FC3-485B-9764-EAC9E56C1D49}" type="datetimeFigureOut">
               <a:rPr lang="en-US" smtClean="0"/>
-              <a:t>10/28/2018</a:t>
+              <a:t>11/12/2018</a:t>
             </a:fld>
             <a:endParaRPr lang="en-US"/>
           </a:p>
@@ -2234,7 +2234,7 @@
           <a:p>
             <a:fld id="{78C97017-6FC3-485B-9764-EAC9E56C1D49}" type="datetimeFigureOut">
               <a:rPr lang="en-US" smtClean="0"/>
-              <a:t>10/28/2018</a:t>
+              <a:t>11/12/2018</a:t>
             </a:fld>
             <a:endParaRPr lang="en-US"/>
           </a:p>
@@ -2329,7 +2329,7 @@
           <a:p>
             <a:fld id="{78C97017-6FC3-485B-9764-EAC9E56C1D49}" type="datetimeFigureOut">
               <a:rPr lang="en-US" smtClean="0"/>
-              <a:t>10/28/2018</a:t>
+              <a:t>11/12/2018</a:t>
             </a:fld>
             <a:endParaRPr lang="en-US"/>
           </a:p>
@@ -2604,7 +2604,7 @@
           <a:p>
             <a:fld id="{78C97017-6FC3-485B-9764-EAC9E56C1D49}" type="datetimeFigureOut">
               <a:rPr lang="en-US" smtClean="0"/>
-              <a:t>10/28/2018</a:t>
+              <a:t>11/12/2018</a:t>
             </a:fld>
             <a:endParaRPr lang="en-US"/>
           </a:p>
@@ -2856,7 +2856,7 @@
           <a:p>
             <a:fld id="{78C97017-6FC3-485B-9764-EAC9E56C1D49}" type="datetimeFigureOut">
               <a:rPr lang="en-US" smtClean="0"/>
-              <a:t>10/28/2018</a:t>
+              <a:t>11/12/2018</a:t>
             </a:fld>
             <a:endParaRPr lang="en-US"/>
           </a:p>
@@ -3067,7 +3067,7 @@
           <a:p>
             <a:fld id="{78C97017-6FC3-485B-9764-EAC9E56C1D49}" type="datetimeFigureOut">
               <a:rPr lang="en-US" smtClean="0"/>
-              <a:t>10/28/2018</a:t>
+              <a:t>11/12/2018</a:t>
             </a:fld>
             <a:endParaRPr lang="en-US"/>
           </a:p>
@@ -3450,8 +3450,8 @@
         </p:nvSpPr>
         <p:spPr>
           <a:xfrm>
-            <a:off x="1119865" y="2086382"/>
-            <a:ext cx="7871735" cy="2937098"/>
+            <a:off x="636132" y="1812341"/>
+            <a:ext cx="7871735" cy="3233318"/>
           </a:xfrm>
           <a:prstGeom prst="roundRect">
             <a:avLst>
@@ -3515,7 +3515,7 @@
         </p:nvSpPr>
         <p:spPr>
           <a:xfrm>
-            <a:off x="2877180" y="3158440"/>
+            <a:off x="2393447" y="2884399"/>
             <a:ext cx="1323049" cy="346760"/>
           </a:xfrm>
           <a:prstGeom prst="rect">
@@ -3593,7 +3593,7 @@
         </p:nvSpPr>
         <p:spPr>
           <a:xfrm rot="16200000">
-            <a:off x="1112465" y="3440185"/>
+            <a:off x="628732" y="3166144"/>
             <a:ext cx="2236632" cy="346760"/>
           </a:xfrm>
           <a:prstGeom prst="rect">
@@ -3656,7 +3656,7 @@
         </p:nvSpPr>
         <p:spPr>
           <a:xfrm rot="16200000">
-            <a:off x="384702" y="3432702"/>
+            <a:off x="-99031" y="3158661"/>
             <a:ext cx="2236635" cy="346760"/>
           </a:xfrm>
           <a:prstGeom prst="rect">
@@ -3730,7 +3730,7 @@
         </p:nvSpPr>
         <p:spPr>
           <a:xfrm rot="16200000">
-            <a:off x="1621449" y="3514563"/>
+            <a:off x="1137716" y="3240522"/>
             <a:ext cx="270504" cy="175523"/>
           </a:xfrm>
           <a:prstGeom prst="triangle">
@@ -3788,7 +3788,7 @@
         </p:nvCxnSpPr>
         <p:spPr>
           <a:xfrm>
-            <a:off x="2656370" y="3326536"/>
+            <a:off x="2172637" y="3052495"/>
             <a:ext cx="220810" cy="5284"/>
           </a:xfrm>
           <a:prstGeom prst="straightConnector1">
@@ -3828,7 +3828,7 @@
         </p:nvCxnSpPr>
         <p:spPr>
           <a:xfrm>
-            <a:off x="893931" y="3600894"/>
+            <a:off x="410198" y="3326853"/>
             <a:ext cx="419548" cy="2860"/>
           </a:xfrm>
           <a:prstGeom prst="bentConnector3">
@@ -3873,7 +3873,7 @@
         </p:nvCxnSpPr>
         <p:spPr>
           <a:xfrm flipV="1">
-            <a:off x="1844463" y="3602324"/>
+            <a:off x="1360730" y="3328283"/>
             <a:ext cx="216105" cy="1"/>
           </a:xfrm>
           <a:prstGeom prst="line">
@@ -3914,7 +3914,7 @@
         </p:nvSpPr>
         <p:spPr>
           <a:xfrm>
-            <a:off x="2420322" y="3239846"/>
+            <a:off x="1936589" y="2965805"/>
             <a:ext cx="236048" cy="173380"/>
           </a:xfrm>
           <a:prstGeom prst="flowChartDecision">
@@ -3968,7 +3968,7 @@
         </p:nvCxnSpPr>
         <p:spPr>
           <a:xfrm flipV="1">
-            <a:off x="4398041" y="3331820"/>
+            <a:off x="3914308" y="3057779"/>
             <a:ext cx="223324" cy="1"/>
           </a:xfrm>
           <a:prstGeom prst="bentConnector3">
@@ -4011,7 +4011,7 @@
         </p:nvSpPr>
         <p:spPr>
           <a:xfrm rot="5400000" flipV="1">
-            <a:off x="4175027" y="3244059"/>
+            <a:off x="3691294" y="2970018"/>
             <a:ext cx="270504" cy="175523"/>
           </a:xfrm>
           <a:prstGeom prst="triangle">
@@ -4069,7 +4069,7 @@
         </p:nvCxnSpPr>
         <p:spPr>
           <a:xfrm>
-            <a:off x="5791200" y="3331820"/>
+            <a:off x="5307467" y="3057779"/>
             <a:ext cx="228600" cy="1970"/>
           </a:xfrm>
           <a:prstGeom prst="bentConnector3">
@@ -4112,7 +4112,7 @@
         </p:nvSpPr>
         <p:spPr>
           <a:xfrm>
-            <a:off x="4621365" y="3158440"/>
+            <a:off x="4137632" y="2884399"/>
             <a:ext cx="1169835" cy="346760"/>
           </a:xfrm>
           <a:prstGeom prst="rect">
@@ -4187,7 +4187,7 @@
         </p:nvSpPr>
         <p:spPr>
           <a:xfrm>
-            <a:off x="2873943" y="2558040"/>
+            <a:off x="2390210" y="2283999"/>
             <a:ext cx="1323049" cy="346760"/>
           </a:xfrm>
           <a:prstGeom prst="rect">
@@ -4268,7 +4268,7 @@
         </p:nvCxnSpPr>
         <p:spPr>
           <a:xfrm>
-            <a:off x="2653133" y="2726136"/>
+            <a:off x="2169400" y="2452095"/>
             <a:ext cx="220810" cy="5284"/>
           </a:xfrm>
           <a:prstGeom prst="straightConnector1">
@@ -4308,7 +4308,7 @@
         </p:nvSpPr>
         <p:spPr>
           <a:xfrm>
-            <a:off x="2417085" y="2639446"/>
+            <a:off x="1933352" y="2365405"/>
             <a:ext cx="236048" cy="173380"/>
           </a:xfrm>
           <a:prstGeom prst="flowChartDecision">
@@ -4362,7 +4362,7 @@
         </p:nvCxnSpPr>
         <p:spPr>
           <a:xfrm flipV="1">
-            <a:off x="4394804" y="2731420"/>
+            <a:off x="3911071" y="2457379"/>
             <a:ext cx="223324" cy="1"/>
           </a:xfrm>
           <a:prstGeom prst="bentConnector3">
@@ -4405,7 +4405,7 @@
         </p:nvSpPr>
         <p:spPr>
           <a:xfrm rot="5400000" flipV="1">
-            <a:off x="4171790" y="2643659"/>
+            <a:off x="3688057" y="2369618"/>
             <a:ext cx="270504" cy="175523"/>
           </a:xfrm>
           <a:prstGeom prst="triangle">
@@ -4460,7 +4460,7 @@
         </p:nvSpPr>
         <p:spPr>
           <a:xfrm>
-            <a:off x="4618128" y="2558040"/>
+            <a:off x="4134395" y="2283999"/>
             <a:ext cx="1093635" cy="346760"/>
           </a:xfrm>
           <a:prstGeom prst="rect">
@@ -4538,7 +4538,7 @@
         </p:nvSpPr>
         <p:spPr>
           <a:xfrm>
-            <a:off x="6019800" y="3160410"/>
+            <a:off x="5536067" y="2886369"/>
             <a:ext cx="1200707" cy="346760"/>
           </a:xfrm>
           <a:prstGeom prst="rect">
@@ -4611,14 +4611,13 @@
           <p:cNvCxnSpPr>
             <a:cxnSpLocks/>
             <a:stCxn id="74" idx="2"/>
-            <a:endCxn id="73" idx="0"/>
           </p:cNvCxnSpPr>
           <p:nvPr/>
         </p:nvCxnSpPr>
         <p:spPr>
           <a:xfrm rot="5400000">
-            <a:off x="8113896" y="3637509"/>
-            <a:ext cx="262826" cy="576"/>
+            <a:off x="7655112" y="3339095"/>
+            <a:ext cx="213505" cy="12700"/>
           </a:xfrm>
           <a:prstGeom prst="bentConnector3">
             <a:avLst>
@@ -4655,7 +4654,7 @@
         </p:nvSpPr>
         <p:spPr>
           <a:xfrm>
-            <a:off x="7615162" y="3769210"/>
+            <a:off x="7131429" y="3455538"/>
             <a:ext cx="1259718" cy="346760"/>
           </a:xfrm>
           <a:prstGeom prst="rect">
@@ -4711,7 +4710,7 @@
         </p:nvSpPr>
         <p:spPr>
           <a:xfrm>
-            <a:off x="7615738" y="3159624"/>
+            <a:off x="7132005" y="2885583"/>
             <a:ext cx="1259718" cy="346760"/>
           </a:xfrm>
           <a:prstGeom prst="rect">
@@ -4783,7 +4782,7 @@
         </p:nvCxnSpPr>
         <p:spPr>
           <a:xfrm flipV="1">
-            <a:off x="7220507" y="3333004"/>
+            <a:off x="6736774" y="3058963"/>
             <a:ext cx="395231" cy="786"/>
           </a:xfrm>
           <a:prstGeom prst="bentConnector3">
@@ -4827,7 +4826,7 @@
         </p:nvSpPr>
         <p:spPr>
           <a:xfrm>
-            <a:off x="2873943" y="3638483"/>
+            <a:off x="2390210" y="3364442"/>
             <a:ext cx="1323049" cy="346760"/>
           </a:xfrm>
           <a:prstGeom prst="rect">
@@ -4914,7 +4913,7 @@
         </p:nvCxnSpPr>
         <p:spPr>
           <a:xfrm>
-            <a:off x="2653133" y="3806579"/>
+            <a:off x="2169400" y="3532538"/>
             <a:ext cx="220810" cy="5284"/>
           </a:xfrm>
           <a:prstGeom prst="straightConnector1">
@@ -4960,7 +4959,7 @@
         </p:nvSpPr>
         <p:spPr>
           <a:xfrm>
-            <a:off x="2417085" y="3719889"/>
+            <a:off x="1933352" y="3445848"/>
             <a:ext cx="236048" cy="173380"/>
           </a:xfrm>
           <a:prstGeom prst="flowChartDecision">
@@ -5020,7 +5019,7 @@
         </p:nvCxnSpPr>
         <p:spPr>
           <a:xfrm flipV="1">
-            <a:off x="4394804" y="3811863"/>
+            <a:off x="3911071" y="3537822"/>
             <a:ext cx="223324" cy="1"/>
           </a:xfrm>
           <a:prstGeom prst="bentConnector3">
@@ -5069,7 +5068,7 @@
         </p:nvSpPr>
         <p:spPr>
           <a:xfrm rot="5400000" flipV="1">
-            <a:off x="4171790" y="3724102"/>
+            <a:off x="3688057" y="3450061"/>
             <a:ext cx="270504" cy="175523"/>
           </a:xfrm>
           <a:prstGeom prst="triangle">
@@ -5133,7 +5132,7 @@
         </p:nvCxnSpPr>
         <p:spPr>
           <a:xfrm>
-            <a:off x="5787963" y="3811863"/>
+            <a:off x="5304230" y="3537822"/>
             <a:ext cx="228600" cy="1970"/>
           </a:xfrm>
           <a:prstGeom prst="bentConnector3">
@@ -5182,7 +5181,7 @@
         </p:nvSpPr>
         <p:spPr>
           <a:xfrm>
-            <a:off x="4618128" y="3638483"/>
+            <a:off x="4134395" y="3364442"/>
             <a:ext cx="1169835" cy="346760"/>
           </a:xfrm>
           <a:prstGeom prst="rect">
@@ -5244,7 +5243,7 @@
         </p:nvSpPr>
         <p:spPr>
           <a:xfrm>
-            <a:off x="6016563" y="3640453"/>
+            <a:off x="5532830" y="3366412"/>
             <a:ext cx="1200707" cy="346760"/>
           </a:xfrm>
           <a:prstGeom prst="rect">
@@ -5325,7 +5324,7 @@
         </p:nvSpPr>
         <p:spPr>
           <a:xfrm>
-            <a:off x="6702288" y="4443042"/>
+            <a:off x="6007286" y="4095428"/>
             <a:ext cx="1259718" cy="346760"/>
           </a:xfrm>
           <a:prstGeom prst="rect">
@@ -5402,7 +5401,7 @@
         </p:nvCxnSpPr>
         <p:spPr>
           <a:xfrm rot="10800000" flipV="1">
-            <a:off x="3352912" y="4210145"/>
+            <a:off x="2657910" y="3862531"/>
             <a:ext cx="3264004" cy="232314"/>
           </a:xfrm>
           <a:prstGeom prst="bentConnector3">
@@ -5446,7 +5445,7 @@
         </p:nvSpPr>
         <p:spPr>
           <a:xfrm>
-            <a:off x="2801638" y="4460002"/>
+            <a:off x="2106636" y="4112388"/>
             <a:ext cx="1169835" cy="346760"/>
           </a:xfrm>
           <a:prstGeom prst="rect">
@@ -5521,7 +5520,7 @@
         </p:nvSpPr>
         <p:spPr>
           <a:xfrm>
-            <a:off x="4101986" y="4451213"/>
+            <a:off x="3406984" y="4103599"/>
             <a:ext cx="1169835" cy="346760"/>
           </a:xfrm>
           <a:prstGeom prst="rect">
@@ -5596,7 +5595,7 @@
         </p:nvSpPr>
         <p:spPr>
           <a:xfrm>
-            <a:off x="5402334" y="4451213"/>
+            <a:off x="4707332" y="4103599"/>
             <a:ext cx="1169835" cy="346760"/>
           </a:xfrm>
           <a:prstGeom prst="rect">
@@ -5672,59 +5671,13 @@
           <p:nvPr/>
         </p:nvCxnSpPr>
         <p:spPr>
-          <a:xfrm rot="10800000" flipV="1">
-            <a:off x="4724459" y="4208174"/>
-            <a:ext cx="1885262" cy="234283"/>
+          <a:xfrm rot="16200000" flipH="1">
+            <a:off x="3911331" y="3976714"/>
+            <a:ext cx="236255" cy="1"/>
           </a:xfrm>
           <a:prstGeom prst="bentConnector3">
             <a:avLst>
-              <a:gd name="adj1" fmla="val 100119"/>
-            </a:avLst>
-          </a:prstGeom>
-          <a:ln w="19050">
-            <a:prstDash val="sysDot"/>
-            <a:headEnd type="none" w="med" len="med"/>
-            <a:tailEnd type="arrow" w="med" len="med"/>
-          </a:ln>
-          <a:effectLst/>
-        </p:spPr>
-        <p:style>
-          <a:lnRef idx="1">
-            <a:schemeClr val="accent6"/>
-          </a:lnRef>
-          <a:fillRef idx="2">
-            <a:schemeClr val="accent6"/>
-          </a:fillRef>
-          <a:effectRef idx="1">
-            <a:schemeClr val="accent6"/>
-          </a:effectRef>
-          <a:fontRef idx="minor">
-            <a:schemeClr val="dk1"/>
-          </a:fontRef>
-        </p:style>
-      </p:cxnSp>
-      <p:cxnSp>
-        <p:nvCxnSpPr>
-          <p:cNvPr id="106" name="Elbow Connector 122">
-            <a:extLst>
-              <a:ext uri="{FF2B5EF4-FFF2-40B4-BE49-F238E27FC236}">
-                <a16:creationId xmlns:a16="http://schemas.microsoft.com/office/drawing/2014/main" id="{709383B5-1681-451D-BCA9-20E9F2C0E2A3}"/>
-              </a:ext>
-            </a:extLst>
-          </p:cNvPr>
-          <p:cNvCxnSpPr>
-            <a:cxnSpLocks/>
-          </p:cNvCxnSpPr>
-          <p:nvPr/>
-        </p:nvCxnSpPr>
-        <p:spPr>
-          <a:xfrm rot="10800000" flipV="1">
-            <a:off x="6016564" y="4206202"/>
-            <a:ext cx="536639" cy="216917"/>
-          </a:xfrm>
-          <a:prstGeom prst="bentConnector3">
-            <a:avLst>
-              <a:gd name="adj1" fmla="val 99698"/>
+              <a:gd name="adj1" fmla="val 50000"/>
             </a:avLst>
           </a:prstGeom>
           <a:ln w="19050">
@@ -5765,8 +5718,8 @@
         </p:nvCxnSpPr>
         <p:spPr>
           <a:xfrm>
-            <a:off x="6616916" y="4206202"/>
-            <a:ext cx="748272" cy="216917"/>
+            <a:off x="5933242" y="3867079"/>
+            <a:ext cx="748272" cy="238609"/>
           </a:xfrm>
           <a:prstGeom prst="bentConnector3">
             <a:avLst>
@@ -5795,35 +5748,27 @@
           </a:fontRef>
         </p:style>
       </p:cxnSp>
-      <p:cxnSp>
-        <p:nvCxnSpPr>
-          <p:cNvPr id="122" name="Elbow Connector 122">
+      <p:sp>
+        <p:nvSpPr>
+          <p:cNvPr id="55" name="Rectangle 8">
             <a:extLst>
               <a:ext uri="{FF2B5EF4-FFF2-40B4-BE49-F238E27FC236}">
-                <a16:creationId xmlns:a16="http://schemas.microsoft.com/office/drawing/2014/main" id="{57FF9698-3AF8-4B3F-90F5-F3B766A0E48A}"/>
+                <a16:creationId xmlns:a16="http://schemas.microsoft.com/office/drawing/2014/main" id="{96DEF2F1-8747-4D62-AAF3-574BED3B654B}"/>
               </a:ext>
             </a:extLst>
           </p:cNvPr>
-          <p:cNvCxnSpPr>
-            <a:cxnSpLocks/>
-          </p:cNvCxnSpPr>
+          <p:cNvSpPr/>
           <p:nvPr/>
-        </p:nvCxnSpPr>
-        <p:spPr>
-          <a:xfrm rot="16200000" flipH="1">
-            <a:off x="6478137" y="4105389"/>
-            <a:ext cx="184008" cy="4060"/>
-          </a:xfrm>
-          <a:prstGeom prst="bentConnector3">
-            <a:avLst>
-              <a:gd name="adj1" fmla="val 50000"/>
-            </a:avLst>
+        </p:nvSpPr>
+        <p:spPr>
+          <a:xfrm>
+            <a:off x="7131429" y="2261088"/>
+            <a:ext cx="1259718" cy="346760"/>
+          </a:xfrm>
+          <a:prstGeom prst="rect">
+            <a:avLst/>
           </a:prstGeom>
-          <a:ln w="19050">
-            <a:prstDash val="sysDot"/>
-            <a:headEnd type="none" w="med" len="med"/>
-            <a:tailEnd type="arrow" w="med" len="med"/>
-          </a:ln>
+          <a:ln w="19050"/>
           <a:effectLst/>
         </p:spPr>
         <p:style>
@@ -5840,13 +5785,50 @@
             <a:schemeClr val="dk1"/>
           </a:fontRef>
         </p:style>
-      </p:cxnSp>
-      <p:sp>
-        <p:nvSpPr>
-          <p:cNvPr id="55" name="Rectangle 8">
+        <p:txBody>
+          <a:bodyPr rtlCol="0" anchor="ctr"/>
+          <a:lstStyle/>
+          <a:p>
+            <a:pPr algn="ctr"/>
+            <a:r>
+              <a:rPr lang="en-US" sz="1050" b="1" dirty="0">
+                <a:solidFill>
+                  <a:schemeClr val="accent6">
+                    <a:lumMod val="75000"/>
+                  </a:schemeClr>
+                </a:solidFill>
+              </a:rPr>
+              <a:t>XmlAdapted</a:t>
+            </a:r>
+          </a:p>
+          <a:p>
+            <a:pPr algn="ctr"/>
+            <a:r>
+              <a:rPr lang="en-US" sz="1050" b="1" dirty="0">
+                <a:solidFill>
+                  <a:schemeClr val="accent6">
+                    <a:lumMod val="75000"/>
+                  </a:schemeClr>
+                </a:solidFill>
+              </a:rPr>
+              <a:t>Reviews</a:t>
+            </a:r>
+            <a:endParaRPr lang="en-SG" sz="1050" b="1" dirty="0">
+              <a:solidFill>
+                <a:schemeClr val="accent6">
+                  <a:lumMod val="75000"/>
+                </a:schemeClr>
+              </a:solidFill>
+            </a:endParaRPr>
+          </a:p>
+        </p:txBody>
+      </p:sp>
+      <p:sp>
+        <p:nvSpPr>
+          <p:cNvPr id="57" name="Rectangle 8">
             <a:extLst>
               <a:ext uri="{FF2B5EF4-FFF2-40B4-BE49-F238E27FC236}">
-                <a16:creationId xmlns:a16="http://schemas.microsoft.com/office/drawing/2014/main" id="{96DEF2F1-8747-4D62-AAF3-574BED3B654B}"/>
+                <a16:creationId xmlns:a16="http://schemas.microsoft.com/office/drawing/2014/main" id="{1D62ED43-BEB3-44F3-8F46-562050376ECB}"/>
               </a:ext>
             </a:extLst>
           </p:cNvPr>
@@ -5855,7 +5837,7 @@
         </p:nvSpPr>
         <p:spPr>
           <a:xfrm>
-            <a:off x="7615162" y="2535129"/>
+            <a:off x="5518595" y="2267202"/>
             <a:ext cx="1259718" cy="346760"/>
           </a:xfrm>
           <a:prstGeom prst="rect">
@@ -5904,81 +5886,6 @@
                   </a:schemeClr>
                 </a:solidFill>
               </a:rPr>
-              <a:t>Reviews</a:t>
-            </a:r>
-            <a:endParaRPr lang="en-SG" sz="1050" b="1" dirty="0">
-              <a:solidFill>
-                <a:schemeClr val="accent6">
-                  <a:lumMod val="75000"/>
-                </a:schemeClr>
-              </a:solidFill>
-            </a:endParaRPr>
-          </a:p>
-        </p:txBody>
-      </p:sp>
-      <p:sp>
-        <p:nvSpPr>
-          <p:cNvPr id="57" name="Rectangle 8">
-            <a:extLst>
-              <a:ext uri="{FF2B5EF4-FFF2-40B4-BE49-F238E27FC236}">
-                <a16:creationId xmlns:a16="http://schemas.microsoft.com/office/drawing/2014/main" id="{1D62ED43-BEB3-44F3-8F46-562050376ECB}"/>
-              </a:ext>
-            </a:extLst>
-          </p:cNvPr>
-          <p:cNvSpPr/>
-          <p:nvPr/>
-        </p:nvSpPr>
-        <p:spPr>
-          <a:xfrm>
-            <a:off x="6002328" y="2541243"/>
-            <a:ext cx="1259718" cy="346760"/>
-          </a:xfrm>
-          <a:prstGeom prst="rect">
-            <a:avLst/>
-          </a:prstGeom>
-          <a:ln w="19050"/>
-          <a:effectLst/>
-        </p:spPr>
-        <p:style>
-          <a:lnRef idx="1">
-            <a:schemeClr val="accent6"/>
-          </a:lnRef>
-          <a:fillRef idx="2">
-            <a:schemeClr val="accent6"/>
-          </a:fillRef>
-          <a:effectRef idx="1">
-            <a:schemeClr val="accent6"/>
-          </a:effectRef>
-          <a:fontRef idx="minor">
-            <a:schemeClr val="dk1"/>
-          </a:fontRef>
-        </p:style>
-        <p:txBody>
-          <a:bodyPr rtlCol="0" anchor="ctr"/>
-          <a:lstStyle/>
-          <a:p>
-            <a:pPr algn="ctr"/>
-            <a:r>
-              <a:rPr lang="en-US" sz="1050" b="1" dirty="0">
-                <a:solidFill>
-                  <a:schemeClr val="accent6">
-                    <a:lumMod val="75000"/>
-                  </a:schemeClr>
-                </a:solidFill>
-              </a:rPr>
-              <a:t>XmlAdapted</a:t>
-            </a:r>
-          </a:p>
-          <a:p>
-            <a:pPr algn="ctr"/>
-            <a:r>
-              <a:rPr lang="en-US" sz="1050" b="1" dirty="0">
-                <a:solidFill>
-                  <a:schemeClr val="accent6">
-                    <a:lumMod val="75000"/>
-                  </a:schemeClr>
-                </a:solidFill>
-              </a:rPr>
               <a:t>UserReviews</a:t>
             </a:r>
             <a:endParaRPr lang="en-SG" sz="1050" b="1" dirty="0">
@@ -6002,15 +5909,14 @@
           </p:cNvPr>
           <p:cNvCxnSpPr>
             <a:cxnSpLocks/>
-            <a:stCxn id="55" idx="2"/>
-            <a:endCxn id="74" idx="0"/>
+            <a:stCxn id="74" idx="0"/>
           </p:cNvCxnSpPr>
           <p:nvPr/>
         </p:nvCxnSpPr>
         <p:spPr>
-          <a:xfrm rot="16200000" flipH="1">
-            <a:off x="8106442" y="3020468"/>
-            <a:ext cx="277735" cy="576"/>
+          <a:xfrm rot="16200000" flipV="1">
+            <a:off x="7632099" y="2755818"/>
+            <a:ext cx="257713" cy="1818"/>
           </a:xfrm>
           <a:prstGeom prst="bentConnector3">
             <a:avLst>
@@ -6057,13 +5963,223 @@
         </p:nvCxnSpPr>
         <p:spPr>
           <a:xfrm rot="10800000" flipV="1">
-            <a:off x="7262046" y="2708509"/>
+            <a:off x="6778313" y="2434468"/>
             <a:ext cx="353116" cy="6114"/>
           </a:xfrm>
           <a:prstGeom prst="bentConnector3">
             <a:avLst>
               <a:gd name="adj1" fmla="val 50000"/>
             </a:avLst>
+          </a:prstGeom>
+          <a:ln w="19050">
+            <a:prstDash val="sysDot"/>
+            <a:headEnd type="none" w="med" len="med"/>
+            <a:tailEnd type="arrow" w="med" len="med"/>
+          </a:ln>
+          <a:effectLst/>
+        </p:spPr>
+        <p:style>
+          <a:lnRef idx="1">
+            <a:schemeClr val="accent6"/>
+          </a:lnRef>
+          <a:fillRef idx="2">
+            <a:schemeClr val="accent6"/>
+          </a:fillRef>
+          <a:effectRef idx="1">
+            <a:schemeClr val="accent6"/>
+          </a:effectRef>
+          <a:fontRef idx="minor">
+            <a:schemeClr val="dk1"/>
+          </a:fontRef>
+        </p:style>
+      </p:cxnSp>
+      <p:cxnSp>
+        <p:nvCxnSpPr>
+          <p:cNvPr id="63" name="Elbow Connector 122">
+            <a:extLst>
+              <a:ext uri="{FF2B5EF4-FFF2-40B4-BE49-F238E27FC236}">
+                <a16:creationId xmlns:a16="http://schemas.microsoft.com/office/drawing/2014/main" id="{6CE994DE-9641-4DE2-AEB5-B0C6EBEC79BB}"/>
+              </a:ext>
+            </a:extLst>
+          </p:cNvPr>
+          <p:cNvCxnSpPr>
+            <a:cxnSpLocks/>
+          </p:cNvCxnSpPr>
+          <p:nvPr/>
+        </p:nvCxnSpPr>
+        <p:spPr>
+          <a:xfrm>
+            <a:off x="5307467" y="3887287"/>
+            <a:ext cx="0" cy="182072"/>
+          </a:xfrm>
+          <a:prstGeom prst="straightConnector1">
+            <a:avLst/>
+          </a:prstGeom>
+          <a:ln w="19050">
+            <a:prstDash val="sysDot"/>
+            <a:headEnd type="none" w="med" len="med"/>
+            <a:tailEnd type="arrow" w="med" len="med"/>
+          </a:ln>
+          <a:effectLst/>
+        </p:spPr>
+        <p:style>
+          <a:lnRef idx="1">
+            <a:schemeClr val="accent6"/>
+          </a:lnRef>
+          <a:fillRef idx="2">
+            <a:schemeClr val="accent6"/>
+          </a:fillRef>
+          <a:effectRef idx="1">
+            <a:schemeClr val="accent6"/>
+          </a:effectRef>
+          <a:fontRef idx="minor">
+            <a:schemeClr val="dk1"/>
+          </a:fontRef>
+        </p:style>
+      </p:cxnSp>
+      <p:cxnSp>
+        <p:nvCxnSpPr>
+          <p:cNvPr id="17" name="Straight Connector 16">
+            <a:extLst>
+              <a:ext uri="{FF2B5EF4-FFF2-40B4-BE49-F238E27FC236}">
+                <a16:creationId xmlns:a16="http://schemas.microsoft.com/office/drawing/2014/main" id="{ACC43399-1C55-4557-A5DA-705B86154775}"/>
+              </a:ext>
+            </a:extLst>
+          </p:cNvPr>
+          <p:cNvCxnSpPr>
+            <a:cxnSpLocks/>
+          </p:cNvCxnSpPr>
+          <p:nvPr/>
+        </p:nvCxnSpPr>
+        <p:spPr>
+          <a:xfrm>
+            <a:off x="6125800" y="3714679"/>
+            <a:ext cx="0" cy="152400"/>
+          </a:xfrm>
+          <a:prstGeom prst="line">
+            <a:avLst/>
+          </a:prstGeom>
+          <a:ln w="9525" cap="flat" cmpd="sng" algn="ctr">
+            <a:solidFill>
+              <a:schemeClr val="accent6"/>
+            </a:solidFill>
+            <a:prstDash val="dash"/>
+            <a:round/>
+            <a:headEnd type="none" w="med" len="med"/>
+            <a:tailEnd type="none" w="med" len="med"/>
+          </a:ln>
+        </p:spPr>
+        <p:style>
+          <a:lnRef idx="0">
+            <a:scrgbClr r="0" g="0" b="0"/>
+          </a:lnRef>
+          <a:fillRef idx="0">
+            <a:scrgbClr r="0" g="0" b="0"/>
+          </a:fillRef>
+          <a:effectRef idx="0">
+            <a:scrgbClr r="0" g="0" b="0"/>
+          </a:effectRef>
+          <a:fontRef idx="minor">
+            <a:schemeClr val="tx1"/>
+          </a:fontRef>
+        </p:style>
+      </p:cxnSp>
+      <p:sp>
+        <p:nvSpPr>
+          <p:cNvPr id="64" name="Rectangle 8">
+            <a:extLst>
+              <a:ext uri="{FF2B5EF4-FFF2-40B4-BE49-F238E27FC236}">
+                <a16:creationId xmlns:a16="http://schemas.microsoft.com/office/drawing/2014/main" id="{1665E6BC-0BF5-44AE-96B4-84C5167169D8}"/>
+              </a:ext>
+            </a:extLst>
+          </p:cNvPr>
+          <p:cNvSpPr/>
+          <p:nvPr/>
+        </p:nvSpPr>
+        <p:spPr>
+          <a:xfrm>
+            <a:off x="7131429" y="4536511"/>
+            <a:ext cx="1259718" cy="346760"/>
+          </a:xfrm>
+          <a:prstGeom prst="rect">
+            <a:avLst/>
+          </a:prstGeom>
+          <a:ln w="19050"/>
+          <a:effectLst/>
+        </p:spPr>
+        <p:style>
+          <a:lnRef idx="1">
+            <a:schemeClr val="accent6"/>
+          </a:lnRef>
+          <a:fillRef idx="2">
+            <a:schemeClr val="accent6"/>
+          </a:fillRef>
+          <a:effectRef idx="1">
+            <a:schemeClr val="accent6"/>
+          </a:effectRef>
+          <a:fontRef idx="minor">
+            <a:schemeClr val="dk1"/>
+          </a:fontRef>
+        </p:style>
+        <p:txBody>
+          <a:bodyPr rtlCol="0" anchor="ctr"/>
+          <a:lstStyle/>
+          <a:p>
+            <a:pPr algn="ctr"/>
+            <a:r>
+              <a:rPr lang="en-US" sz="1050" b="1" dirty="0">
+                <a:solidFill>
+                  <a:schemeClr val="accent6">
+                    <a:lumMod val="75000"/>
+                  </a:schemeClr>
+                </a:solidFill>
+              </a:rPr>
+              <a:t>XmlAdapted</a:t>
+            </a:r>
+          </a:p>
+          <a:p>
+            <a:pPr algn="ctr"/>
+            <a:r>
+              <a:rPr lang="en-US" sz="1050" b="1" dirty="0">
+                <a:solidFill>
+                  <a:schemeClr val="accent6">
+                    <a:lumMod val="75000"/>
+                  </a:schemeClr>
+                </a:solidFill>
+              </a:rPr>
+              <a:t>RestaurantReview</a:t>
+            </a:r>
+            <a:endParaRPr lang="en-SG" sz="1050" b="1" dirty="0">
+              <a:solidFill>
+                <a:schemeClr val="accent6">
+                  <a:lumMod val="75000"/>
+                </a:schemeClr>
+              </a:solidFill>
+            </a:endParaRPr>
+          </a:p>
+        </p:txBody>
+      </p:sp>
+      <p:cxnSp>
+        <p:nvCxnSpPr>
+          <p:cNvPr id="68" name="Elbow Connector 122">
+            <a:extLst>
+              <a:ext uri="{FF2B5EF4-FFF2-40B4-BE49-F238E27FC236}">
+                <a16:creationId xmlns:a16="http://schemas.microsoft.com/office/drawing/2014/main" id="{09AA8B87-834F-4D65-BFDC-2A4020CA3A26}"/>
+              </a:ext>
+            </a:extLst>
+          </p:cNvPr>
+          <p:cNvCxnSpPr>
+            <a:cxnSpLocks/>
+          </p:cNvCxnSpPr>
+          <p:nvPr/>
+        </p:nvCxnSpPr>
+        <p:spPr>
+          <a:xfrm>
+            <a:off x="6696515" y="3866721"/>
+            <a:ext cx="1079774" cy="662732"/>
+          </a:xfrm>
+          <a:prstGeom prst="bentConnector2">
+            <a:avLst/>
           </a:prstGeom>
           <a:ln w="19050">
             <a:prstDash val="sysDot"/>

</xml_diff>